<commit_message>
Malla receptora de información completa
</commit_message>
<xml_diff>
--- a/P2/Malla Receptora de Información.pptx
+++ b/P2/Malla Receptora de Información.pptx
@@ -5,9 +5,7 @@
     <p:sldMasterId id="2147483648" r:id="rId4"/>
   </p:sldMasterIdLst>
   <p:sldIdLst>
-    <p:sldId id="260" r:id="rId5"/>
-    <p:sldId id="262" r:id="rId6"/>
-    <p:sldId id="261" r:id="rId7"/>
+    <p:sldId id="262" r:id="rId5"/>
   </p:sldIdLst>
   <p:sldSz cx="12192000" cy="6858000"/>
   <p:notesSz cx="6858000" cy="9144000"/>
@@ -272,7 +270,7 @@
           <a:p>
             <a:fld id="{EFFBDDF0-6D3C-4277-AB36-132ECC7ACCF5}" type="datetimeFigureOut">
               <a:rPr lang="en-US" smtClean="0"/>
-              <a:t>7/24/2020</a:t>
+              <a:t>4/7/2021</a:t>
             </a:fld>
             <a:endParaRPr lang="en-US"/>
           </a:p>
@@ -326,7 +324,7 @@
           <a:p>
             <a:fld id="{823A4800-D636-418A-9240-5C2AA67518C1}" type="slidenum">
               <a:rPr lang="en-US" smtClean="0"/>
-              <a:t>‹#›</a:t>
+              <a:t>‹Nº›</a:t>
             </a:fld>
             <a:endParaRPr lang="en-US"/>
           </a:p>
@@ -470,7 +468,7 @@
           <a:p>
             <a:fld id="{EFFBDDF0-6D3C-4277-AB36-132ECC7ACCF5}" type="datetimeFigureOut">
               <a:rPr lang="en-US" smtClean="0"/>
-              <a:t>7/24/2020</a:t>
+              <a:t>4/7/2021</a:t>
             </a:fld>
             <a:endParaRPr lang="en-US"/>
           </a:p>
@@ -524,7 +522,7 @@
           <a:p>
             <a:fld id="{823A4800-D636-418A-9240-5C2AA67518C1}" type="slidenum">
               <a:rPr lang="en-US" smtClean="0"/>
-              <a:t>‹#›</a:t>
+              <a:t>‹Nº›</a:t>
             </a:fld>
             <a:endParaRPr lang="en-US"/>
           </a:p>
@@ -678,7 +676,7 @@
           <a:p>
             <a:fld id="{EFFBDDF0-6D3C-4277-AB36-132ECC7ACCF5}" type="datetimeFigureOut">
               <a:rPr lang="en-US" smtClean="0"/>
-              <a:t>7/24/2020</a:t>
+              <a:t>4/7/2021</a:t>
             </a:fld>
             <a:endParaRPr lang="en-US"/>
           </a:p>
@@ -732,7 +730,7 @@
           <a:p>
             <a:fld id="{823A4800-D636-418A-9240-5C2AA67518C1}" type="slidenum">
               <a:rPr lang="en-US" smtClean="0"/>
-              <a:t>‹#›</a:t>
+              <a:t>‹Nº›</a:t>
             </a:fld>
             <a:endParaRPr lang="en-US"/>
           </a:p>
@@ -1160,7 +1158,7 @@
           <a:p>
             <a:fld id="{EFFBDDF0-6D3C-4277-AB36-132ECC7ACCF5}" type="datetimeFigureOut">
               <a:rPr lang="en-US" smtClean="0"/>
-              <a:t>7/24/2020</a:t>
+              <a:t>4/7/2021</a:t>
             </a:fld>
             <a:endParaRPr lang="en-US"/>
           </a:p>
@@ -1214,7 +1212,7 @@
           <a:p>
             <a:fld id="{823A4800-D636-418A-9240-5C2AA67518C1}" type="slidenum">
               <a:rPr lang="en-US" smtClean="0"/>
-              <a:t>‹#›</a:t>
+              <a:t>‹Nº›</a:t>
             </a:fld>
             <a:endParaRPr lang="en-US"/>
           </a:p>
@@ -1425,7 +1423,7 @@
           <a:p>
             <a:fld id="{EFFBDDF0-6D3C-4277-AB36-132ECC7ACCF5}" type="datetimeFigureOut">
               <a:rPr lang="en-US" smtClean="0"/>
-              <a:t>7/24/2020</a:t>
+              <a:t>4/7/2021</a:t>
             </a:fld>
             <a:endParaRPr lang="en-US"/>
           </a:p>
@@ -1479,7 +1477,7 @@
           <a:p>
             <a:fld id="{823A4800-D636-418A-9240-5C2AA67518C1}" type="slidenum">
               <a:rPr lang="en-US" smtClean="0"/>
-              <a:t>‹#›</a:t>
+              <a:t>‹Nº›</a:t>
             </a:fld>
             <a:endParaRPr lang="en-US"/>
           </a:p>
@@ -1837,7 +1835,7 @@
           <a:p>
             <a:fld id="{EFFBDDF0-6D3C-4277-AB36-132ECC7ACCF5}" type="datetimeFigureOut">
               <a:rPr lang="en-US" smtClean="0"/>
-              <a:t>7/24/2020</a:t>
+              <a:t>4/7/2021</a:t>
             </a:fld>
             <a:endParaRPr lang="en-US"/>
           </a:p>
@@ -1891,7 +1889,7 @@
           <a:p>
             <a:fld id="{823A4800-D636-418A-9240-5C2AA67518C1}" type="slidenum">
               <a:rPr lang="en-US" smtClean="0"/>
-              <a:t>‹#›</a:t>
+              <a:t>‹Nº›</a:t>
             </a:fld>
             <a:endParaRPr lang="en-US"/>
           </a:p>
@@ -1978,7 +1976,7 @@
           <a:p>
             <a:fld id="{EFFBDDF0-6D3C-4277-AB36-132ECC7ACCF5}" type="datetimeFigureOut">
               <a:rPr lang="en-US" smtClean="0"/>
-              <a:t>7/24/2020</a:t>
+              <a:t>4/7/2021</a:t>
             </a:fld>
             <a:endParaRPr lang="en-US"/>
           </a:p>
@@ -2032,7 +2030,7 @@
           <a:p>
             <a:fld id="{823A4800-D636-418A-9240-5C2AA67518C1}" type="slidenum">
               <a:rPr lang="en-US" smtClean="0"/>
-              <a:t>‹#›</a:t>
+              <a:t>‹Nº›</a:t>
             </a:fld>
             <a:endParaRPr lang="en-US"/>
           </a:p>
@@ -2091,7 +2089,7 @@
           <a:p>
             <a:fld id="{EFFBDDF0-6D3C-4277-AB36-132ECC7ACCF5}" type="datetimeFigureOut">
               <a:rPr lang="en-US" smtClean="0"/>
-              <a:t>7/24/2020</a:t>
+              <a:t>4/7/2021</a:t>
             </a:fld>
             <a:endParaRPr lang="en-US"/>
           </a:p>
@@ -2145,7 +2143,7 @@
           <a:p>
             <a:fld id="{823A4800-D636-418A-9240-5C2AA67518C1}" type="slidenum">
               <a:rPr lang="en-US" smtClean="0"/>
-              <a:t>‹#›</a:t>
+              <a:t>‹Nº›</a:t>
             </a:fld>
             <a:endParaRPr lang="en-US"/>
           </a:p>
@@ -2402,7 +2400,7 @@
           <a:p>
             <a:fld id="{EFFBDDF0-6D3C-4277-AB36-132ECC7ACCF5}" type="datetimeFigureOut">
               <a:rPr lang="en-US" smtClean="0"/>
-              <a:t>7/24/2020</a:t>
+              <a:t>4/7/2021</a:t>
             </a:fld>
             <a:endParaRPr lang="en-US"/>
           </a:p>
@@ -2456,7 +2454,7 @@
           <a:p>
             <a:fld id="{823A4800-D636-418A-9240-5C2AA67518C1}" type="slidenum">
               <a:rPr lang="en-US" smtClean="0"/>
-              <a:t>‹#›</a:t>
+              <a:t>‹Nº›</a:t>
             </a:fld>
             <a:endParaRPr lang="en-US"/>
           </a:p>
@@ -2690,7 +2688,7 @@
           <a:p>
             <a:fld id="{EFFBDDF0-6D3C-4277-AB36-132ECC7ACCF5}" type="datetimeFigureOut">
               <a:rPr lang="en-US" smtClean="0"/>
-              <a:t>7/24/2020</a:t>
+              <a:t>4/7/2021</a:t>
             </a:fld>
             <a:endParaRPr lang="en-US"/>
           </a:p>
@@ -2744,7 +2742,7 @@
           <a:p>
             <a:fld id="{823A4800-D636-418A-9240-5C2AA67518C1}" type="slidenum">
               <a:rPr lang="en-US" smtClean="0"/>
-              <a:t>‹#›</a:t>
+              <a:t>‹Nº›</a:t>
             </a:fld>
             <a:endParaRPr lang="en-US"/>
           </a:p>
@@ -2931,7 +2929,7 @@
           <a:p>
             <a:fld id="{EFFBDDF0-6D3C-4277-AB36-132ECC7ACCF5}" type="datetimeFigureOut">
               <a:rPr lang="en-US" smtClean="0"/>
-              <a:t>7/24/2020</a:t>
+              <a:t>4/7/2021</a:t>
             </a:fld>
             <a:endParaRPr lang="en-US"/>
           </a:p>
@@ -3021,7 +3019,7 @@
           <a:p>
             <a:fld id="{823A4800-D636-418A-9240-5C2AA67518C1}" type="slidenum">
               <a:rPr lang="en-US" smtClean="0"/>
-              <a:t>‹#›</a:t>
+              <a:t>‹Nº›</a:t>
             </a:fld>
             <a:endParaRPr lang="en-US"/>
           </a:p>
@@ -3350,311 +3348,6 @@
       </p:grpSpPr>
       <p:sp>
         <p:nvSpPr>
-          <p:cNvPr id="3" name="Content Placeholder 2">
-            <a:extLst>
-              <a:ext uri="{FF2B5EF4-FFF2-40B4-BE49-F238E27FC236}">
-                <a16:creationId xmlns:a16="http://schemas.microsoft.com/office/drawing/2014/main" id="{5AC0FA28-B511-4565-8C8A-44DEE740CC90}"/>
-              </a:ext>
-            </a:extLst>
-          </p:cNvPr>
-          <p:cNvSpPr>
-            <a:spLocks noGrp="1"/>
-          </p:cNvSpPr>
-          <p:nvPr>
-            <p:ph idx="1"/>
-          </p:nvPr>
-        </p:nvSpPr>
-        <p:spPr>
-          <a:xfrm>
-            <a:off x="257175" y="1274445"/>
-            <a:ext cx="11704320" cy="4176713"/>
-          </a:xfrm>
-        </p:spPr>
-        <p:txBody>
-          <a:bodyPr>
-            <a:noAutofit/>
-          </a:bodyPr>
-          <a:lstStyle/>
-          <a:p>
-            <a:pPr marL="0" indent="0">
-              <a:buNone/>
-            </a:pPr>
-            <a:r>
-              <a:rPr lang="en-US" sz="1800" dirty="0">
-                <a:solidFill>
-                  <a:schemeClr val="accent1"/>
-                </a:solidFill>
-              </a:rPr>
-              <a:t>A Feedback Capture Grid is a way of organizing and summarizing feedback on a product or service during a trial run. Specifically, all feedback is organized into what individuals like about the product or service, what needs to be changed, questions that still remain among the testers, and ideas to improve the innovation. This tool can be used during a test of a product or service or after the test so that reactions can be captured in a systematic way.</a:t>
-            </a:r>
-          </a:p>
-          <a:p>
-            <a:pPr marL="0" indent="0">
-              <a:buNone/>
-            </a:pPr>
-            <a:r>
-              <a:rPr lang="en-US" sz="1800" dirty="0">
-                <a:solidFill>
-                  <a:schemeClr val="accent1"/>
-                </a:solidFill>
-              </a:rPr>
-              <a:t>In order to utilize a feedback capture grid, all positive feedback will go in the “likes” quadrant, negative comments about the prototype are placed in the “criticisms” quadrant, any questions that users raised during the test session about the product or service are placed in the “questions” quadrant, and ideas for improvement generated during the testing session are placed in the “ideas” quadrant. </a:t>
-            </a:r>
-          </a:p>
-          <a:p>
-            <a:pPr marL="0" indent="0">
-              <a:buNone/>
-            </a:pPr>
-            <a:endParaRPr lang="en-US" sz="1800" dirty="0">
-              <a:solidFill>
-                <a:schemeClr val="accent1"/>
-              </a:solidFill>
-            </a:endParaRPr>
-          </a:p>
-          <a:p>
-            <a:pPr marL="0" indent="0">
-              <a:buNone/>
-            </a:pPr>
-            <a:br>
-              <a:rPr lang="en-US" sz="1800" dirty="0">
-                <a:solidFill>
-                  <a:schemeClr val="accent1"/>
-                </a:solidFill>
-              </a:rPr>
-            </a:br>
-            <a:br>
-              <a:rPr lang="en-US" sz="1800" dirty="0">
-                <a:solidFill>
-                  <a:schemeClr val="accent1"/>
-                </a:solidFill>
-              </a:rPr>
-            </a:br>
-            <a:endParaRPr lang="en-US" sz="1800" dirty="0">
-              <a:solidFill>
-                <a:schemeClr val="accent1"/>
-              </a:solidFill>
-            </a:endParaRPr>
-          </a:p>
-        </p:txBody>
-      </p:sp>
-      <p:sp>
-        <p:nvSpPr>
-          <p:cNvPr id="5" name="TextBox 4">
-            <a:extLst>
-              <a:ext uri="{FF2B5EF4-FFF2-40B4-BE49-F238E27FC236}">
-                <a16:creationId xmlns:a16="http://schemas.microsoft.com/office/drawing/2014/main" id="{E1829E29-EF69-4153-95EC-9C1110DC19B6}"/>
-              </a:ext>
-            </a:extLst>
-          </p:cNvPr>
-          <p:cNvSpPr txBox="1"/>
-          <p:nvPr/>
-        </p:nvSpPr>
-        <p:spPr>
-          <a:xfrm>
-            <a:off x="13335" y="6582975"/>
-            <a:ext cx="12192000" cy="276999"/>
-          </a:xfrm>
-          <a:prstGeom prst="rect">
-            <a:avLst/>
-          </a:prstGeom>
-          <a:solidFill>
-            <a:schemeClr val="accent4">
-              <a:lumMod val="20000"/>
-              <a:lumOff val="80000"/>
-            </a:schemeClr>
-          </a:solidFill>
-        </p:spPr>
-        <p:txBody>
-          <a:bodyPr wrap="square" rtlCol="0">
-            <a:spAutoFit/>
-          </a:bodyPr>
-          <a:lstStyle/>
-          <a:p>
-            <a:pPr lvl="0" algn="ctr"/>
-            <a:r>
-              <a:rPr lang="en-US" sz="1200" kern="1200" dirty="0">
-                <a:solidFill>
-                  <a:schemeClr val="tx1"/>
-                </a:solidFill>
-                <a:effectLst/>
-                <a:latin typeface="Roboto" panose="02000000000000000000" pitchFamily="2" charset="0"/>
-                <a:ea typeface="Roboto" panose="02000000000000000000" pitchFamily="2" charset="0"/>
-              </a:rPr>
-              <a:t>Want more tools and templates? </a:t>
-            </a:r>
-            <a:r>
-              <a:rPr lang="en-US" sz="1200" dirty="0">
-                <a:latin typeface="Roboto" panose="02000000000000000000" pitchFamily="2" charset="0"/>
-                <a:ea typeface="Roboto" panose="02000000000000000000" pitchFamily="2" charset="0"/>
-              </a:rPr>
-              <a:t>Visit </a:t>
-            </a:r>
-            <a:r>
-              <a:rPr lang="en-US" sz="1200" dirty="0">
-                <a:latin typeface="Roboto" panose="02000000000000000000" pitchFamily="2" charset="0"/>
-                <a:ea typeface="Roboto" panose="02000000000000000000" pitchFamily="2" charset="0"/>
-                <a:hlinkClick r:id="rId2"/>
-              </a:rPr>
-              <a:t>https://upboard.io/</a:t>
-            </a:r>
-            <a:r>
-              <a:rPr lang="en-US" sz="1200" dirty="0">
-                <a:latin typeface="Roboto" panose="02000000000000000000" pitchFamily="2" charset="0"/>
-                <a:ea typeface="Roboto" panose="02000000000000000000" pitchFamily="2" charset="0"/>
-              </a:rPr>
-              <a:t> </a:t>
-            </a:r>
-            <a:endParaRPr lang="en-US" sz="1200" kern="1200" dirty="0">
-              <a:solidFill>
-                <a:schemeClr val="tx1"/>
-              </a:solidFill>
-              <a:effectLst/>
-              <a:latin typeface="Roboto" panose="02000000000000000000" pitchFamily="2" charset="0"/>
-              <a:ea typeface="Roboto" panose="02000000000000000000" pitchFamily="2" charset="0"/>
-            </a:endParaRPr>
-          </a:p>
-        </p:txBody>
-      </p:sp>
-      <p:sp>
-        <p:nvSpPr>
-          <p:cNvPr id="7" name="Title 6">
-            <a:extLst>
-              <a:ext uri="{FF2B5EF4-FFF2-40B4-BE49-F238E27FC236}">
-                <a16:creationId xmlns:a16="http://schemas.microsoft.com/office/drawing/2014/main" id="{0E5312BC-D894-4EF1-B411-739DA565E3FB}"/>
-              </a:ext>
-            </a:extLst>
-          </p:cNvPr>
-          <p:cNvSpPr>
-            <a:spLocks noGrp="1"/>
-          </p:cNvSpPr>
-          <p:nvPr>
-            <p:ph type="title"/>
-          </p:nvPr>
-        </p:nvSpPr>
-        <p:spPr/>
-        <p:txBody>
-          <a:bodyPr/>
-          <a:lstStyle/>
-          <a:p>
-            <a:r>
-              <a:rPr lang="en-US" b="1" dirty="0">
-                <a:latin typeface="+mn-lt"/>
-              </a:rPr>
-              <a:t>Feedback Capture Grid Template</a:t>
-            </a:r>
-          </a:p>
-        </p:txBody>
-      </p:sp>
-    </p:spTree>
-    <p:extLst>
-      <p:ext uri="{BB962C8B-B14F-4D97-AF65-F5344CB8AC3E}">
-        <p14:creationId xmlns:p14="http://schemas.microsoft.com/office/powerpoint/2010/main" val="1643245364"/>
-      </p:ext>
-    </p:extLst>
-  </p:cSld>
-  <p:clrMapOvr>
-    <a:masterClrMapping/>
-  </p:clrMapOvr>
-</p:sld>
-</file>
-
-<file path=ppt/slides/slide2.xml><?xml version="1.0" encoding="utf-8"?>
-<p:sld xmlns:a="http://schemas.openxmlformats.org/drawingml/2006/main" xmlns:r="http://schemas.openxmlformats.org/officeDocument/2006/relationships" xmlns:p="http://schemas.openxmlformats.org/presentationml/2006/main">
-  <p:cSld>
-    <p:spTree>
-      <p:nvGrpSpPr>
-        <p:cNvPr id="1" name=""/>
-        <p:cNvGrpSpPr/>
-        <p:nvPr/>
-      </p:nvGrpSpPr>
-      <p:grpSpPr>
-        <a:xfrm>
-          <a:off x="0" y="0"/>
-          <a:ext cx="0" cy="0"/>
-          <a:chOff x="0" y="0"/>
-          <a:chExt cx="0" cy="0"/>
-        </a:xfrm>
-      </p:grpSpPr>
-      <p:sp>
-        <p:nvSpPr>
-          <p:cNvPr id="5" name="TextBox 4">
-            <a:extLst>
-              <a:ext uri="{FF2B5EF4-FFF2-40B4-BE49-F238E27FC236}">
-                <a16:creationId xmlns:a16="http://schemas.microsoft.com/office/drawing/2014/main" id="{E1829E29-EF69-4153-95EC-9C1110DC19B6}"/>
-              </a:ext>
-            </a:extLst>
-          </p:cNvPr>
-          <p:cNvSpPr txBox="1"/>
-          <p:nvPr/>
-        </p:nvSpPr>
-        <p:spPr>
-          <a:xfrm>
-            <a:off x="13335" y="6582975"/>
-            <a:ext cx="12192000" cy="276999"/>
-          </a:xfrm>
-          <a:prstGeom prst="rect">
-            <a:avLst/>
-          </a:prstGeom>
-          <a:solidFill>
-            <a:schemeClr val="accent4">
-              <a:lumMod val="20000"/>
-              <a:lumOff val="80000"/>
-            </a:schemeClr>
-          </a:solidFill>
-        </p:spPr>
-        <p:txBody>
-          <a:bodyPr wrap="square" rtlCol="0">
-            <a:spAutoFit/>
-          </a:bodyPr>
-          <a:lstStyle/>
-          <a:p>
-            <a:pPr lvl="0" algn="ctr"/>
-            <a:r>
-              <a:rPr lang="en-US" sz="1200" kern="1200" dirty="0">
-                <a:solidFill>
-                  <a:schemeClr val="tx1"/>
-                </a:solidFill>
-                <a:effectLst/>
-                <a:latin typeface="Roboto" panose="02000000000000000000" pitchFamily="2" charset="0"/>
-                <a:ea typeface="Roboto" panose="02000000000000000000" pitchFamily="2" charset="0"/>
-              </a:rPr>
-              <a:t>Want more tools and templates? </a:t>
-            </a:r>
-            <a:r>
-              <a:rPr lang="en-US" sz="1200" dirty="0">
-                <a:latin typeface="Roboto" panose="02000000000000000000" pitchFamily="2" charset="0"/>
-                <a:ea typeface="Roboto" panose="02000000000000000000" pitchFamily="2" charset="0"/>
-              </a:rPr>
-              <a:t>Visit </a:t>
-            </a:r>
-            <a:r>
-              <a:rPr lang="en-US" sz="1200" dirty="0">
-                <a:latin typeface="Roboto" panose="02000000000000000000" pitchFamily="2" charset="0"/>
-                <a:ea typeface="Roboto" panose="02000000000000000000" pitchFamily="2" charset="0"/>
-                <a:hlinkClick r:id="rId2"/>
-              </a:rPr>
-              <a:t>https://upboard.io/</a:t>
-            </a:r>
-            <a:r>
-              <a:rPr lang="en-US" sz="1200" dirty="0">
-                <a:latin typeface="Roboto" panose="02000000000000000000" pitchFamily="2" charset="0"/>
-                <a:ea typeface="Roboto" panose="02000000000000000000" pitchFamily="2" charset="0"/>
-              </a:rPr>
-              <a:t> </a:t>
-            </a:r>
-            <a:endParaRPr lang="en-US" sz="1200" kern="1200" dirty="0">
-              <a:solidFill>
-                <a:schemeClr val="tx1"/>
-              </a:solidFill>
-              <a:effectLst/>
-              <a:latin typeface="Roboto" panose="02000000000000000000" pitchFamily="2" charset="0"/>
-              <a:ea typeface="Roboto" panose="02000000000000000000" pitchFamily="2" charset="0"/>
-            </a:endParaRPr>
-          </a:p>
-        </p:txBody>
-      </p:sp>
-      <p:sp>
-        <p:nvSpPr>
           <p:cNvPr id="9" name="Title 6">
             <a:extLst>
               <a:ext uri="{FF2B5EF4-FFF2-40B4-BE49-F238E27FC236}">
@@ -3698,14 +3391,14 @@
           <p:nvPr>
             <p:extLst>
               <p:ext uri="{D42A27DB-BD31-4B8C-83A1-F6EECF244321}">
-                <p14:modId xmlns:p14="http://schemas.microsoft.com/office/powerpoint/2010/main" val="3981265940"/>
+                <p14:modId xmlns:p14="http://schemas.microsoft.com/office/powerpoint/2010/main" val="3686357246"/>
               </p:ext>
             </p:extLst>
           </p:nvPr>
         </p:nvGraphicFramePr>
         <p:xfrm>
-          <a:off x="224418" y="862549"/>
-          <a:ext cx="11743163" cy="5538914"/>
+          <a:off x="224418" y="775067"/>
+          <a:ext cx="11743163" cy="5956326"/>
         </p:xfrm>
         <a:graphic>
           <a:graphicData uri="http://schemas.openxmlformats.org/drawingml/2006/table">
@@ -3729,7 +3422,7 @@
                   </a:extLst>
                 </a:gridCol>
               </a:tblGrid>
-              <a:tr h="0">
+              <a:tr h="520797">
                 <a:tc>
                   <a:txBody>
                     <a:bodyPr/>
@@ -3737,9 +3430,18 @@
                     <a:p>
                       <a:pPr algn="ctr"/>
                       <a:r>
+                        <a:rPr lang="en-US" sz="1800" dirty="0" err="1"/>
+                        <a:t>Interesante</a:t>
+                      </a:r>
+                      <a:r>
                         <a:rPr lang="en-US" sz="1800" dirty="0"/>
-                        <a:t> Positive Feedback</a:t>
-                      </a:r>
+                        <a:t>/</a:t>
+                      </a:r>
+                      <a:r>
+                        <a:rPr lang="en-US" sz="1800" dirty="0" err="1"/>
+                        <a:t>Relevante</a:t>
+                      </a:r>
+                      <a:endParaRPr lang="en-US" sz="1800" dirty="0"/>
                     </a:p>
                   </a:txBody>
                   <a:tcPr marL="249718" marR="249718" marT="124859" marB="124859" anchor="ctr"/>
@@ -3751,9 +3453,18 @@
                     <a:p>
                       <a:pPr algn="ctr"/>
                       <a:r>
+                        <a:rPr lang="en-US" sz="1800" dirty="0" err="1"/>
+                        <a:t>Críticas</a:t>
+                      </a:r>
+                      <a:r>
                         <a:rPr lang="en-US" sz="1800" dirty="0"/>
-                        <a:t>Criticisms</a:t>
-                      </a:r>
+                        <a:t> </a:t>
+                      </a:r>
+                      <a:r>
+                        <a:rPr lang="en-US" sz="1800" dirty="0" err="1"/>
+                        <a:t>Constructivas</a:t>
+                      </a:r>
+                      <a:endParaRPr lang="en-US" sz="1800" dirty="0"/>
                     </a:p>
                   </a:txBody>
                   <a:tcPr marL="249718" marR="249718" marT="124859" marB="124859" anchor="ctr"/>
@@ -3764,7 +3475,7 @@
                   </a:ext>
                 </a:extLst>
               </a:tr>
-              <a:tr h="2229063">
+              <a:tr h="2098212">
                 <a:tc>
                   <a:txBody>
                     <a:bodyPr/>
@@ -3775,15 +3486,221 @@
                         <a:buChar char="•"/>
                       </a:pPr>
                       <a:r>
-                        <a:rPr lang="en-US" sz="1400" i="0" dirty="0">
-                          <a:solidFill>
-                            <a:schemeClr val="bg2">
-                              <a:lumMod val="50000"/>
-                            </a:schemeClr>
-                          </a:solidFill>
-                        </a:rPr>
-                        <a:t>List all positive feedback</a:t>
-                      </a:r>
+                        <a:rPr lang="en-US" sz="1400" i="0" dirty="0" err="1">
+                          <a:solidFill>
+                            <a:schemeClr val="bg2">
+                              <a:lumMod val="50000"/>
+                            </a:schemeClr>
+                          </a:solidFill>
+                        </a:rPr>
+                        <a:t>Información</a:t>
+                      </a:r>
+                      <a:r>
+                        <a:rPr lang="en-US" sz="1400" i="0" dirty="0">
+                          <a:solidFill>
+                            <a:schemeClr val="bg2">
+                              <a:lumMod val="50000"/>
+                            </a:schemeClr>
+                          </a:solidFill>
+                        </a:rPr>
+                        <a:t> </a:t>
+                      </a:r>
+                      <a:r>
+                        <a:rPr lang="en-US" sz="1400" i="0" dirty="0" err="1">
+                          <a:solidFill>
+                            <a:schemeClr val="bg2">
+                              <a:lumMod val="50000"/>
+                            </a:schemeClr>
+                          </a:solidFill>
+                        </a:rPr>
+                        <a:t>completa</a:t>
+                      </a:r>
+                      <a:endParaRPr lang="en-US" sz="1400" i="0" dirty="0">
+                        <a:solidFill>
+                          <a:schemeClr val="bg2">
+                            <a:lumMod val="50000"/>
+                          </a:schemeClr>
+                        </a:solidFill>
+                      </a:endParaRPr>
+                    </a:p>
+                    <a:p>
+                      <a:pPr marL="285750" indent="-285750" algn="l">
+                        <a:buFont typeface="Arial" panose="020B0604020202020204" pitchFamily="34" charset="0"/>
+                        <a:buChar char="•"/>
+                      </a:pPr>
+                      <a:r>
+                        <a:rPr lang="en-US" sz="1400" i="0" dirty="0" err="1">
+                          <a:solidFill>
+                            <a:schemeClr val="bg2">
+                              <a:lumMod val="50000"/>
+                            </a:schemeClr>
+                          </a:solidFill>
+                        </a:rPr>
+                        <a:t>Interfaz</a:t>
+                      </a:r>
+                      <a:r>
+                        <a:rPr lang="en-US" sz="1400" i="0" dirty="0">
+                          <a:solidFill>
+                            <a:schemeClr val="bg2">
+                              <a:lumMod val="50000"/>
+                            </a:schemeClr>
+                          </a:solidFill>
+                        </a:rPr>
+                        <a:t> simple y </a:t>
+                      </a:r>
+                      <a:r>
+                        <a:rPr lang="en-US" sz="1400" i="0" dirty="0" err="1">
+                          <a:solidFill>
+                            <a:schemeClr val="bg2">
+                              <a:lumMod val="50000"/>
+                            </a:schemeClr>
+                          </a:solidFill>
+                        </a:rPr>
+                        <a:t>entendible</a:t>
+                      </a:r>
+                      <a:endParaRPr lang="en-US" sz="1400" i="0" dirty="0">
+                        <a:solidFill>
+                          <a:schemeClr val="bg2">
+                            <a:lumMod val="50000"/>
+                          </a:schemeClr>
+                        </a:solidFill>
+                      </a:endParaRPr>
+                    </a:p>
+                    <a:p>
+                      <a:pPr marL="285750" indent="-285750" algn="l">
+                        <a:buFont typeface="Arial" panose="020B0604020202020204" pitchFamily="34" charset="0"/>
+                        <a:buChar char="•"/>
+                      </a:pPr>
+                      <a:r>
+                        <a:rPr lang="en-US" sz="1400" i="0" dirty="0" err="1">
+                          <a:solidFill>
+                            <a:schemeClr val="bg2">
+                              <a:lumMod val="50000"/>
+                            </a:schemeClr>
+                          </a:solidFill>
+                        </a:rPr>
+                        <a:t>Posibilidad</a:t>
+                      </a:r>
+                      <a:r>
+                        <a:rPr lang="en-US" sz="1400" i="0" dirty="0">
+                          <a:solidFill>
+                            <a:schemeClr val="bg2">
+                              <a:lumMod val="50000"/>
+                            </a:schemeClr>
+                          </a:solidFill>
+                        </a:rPr>
+                        <a:t> de </a:t>
+                      </a:r>
+                      <a:r>
+                        <a:rPr lang="en-US" sz="1400" i="0" dirty="0" err="1">
+                          <a:solidFill>
+                            <a:schemeClr val="bg2">
+                              <a:lumMod val="50000"/>
+                            </a:schemeClr>
+                          </a:solidFill>
+                        </a:rPr>
+                        <a:t>enviar</a:t>
+                      </a:r>
+                      <a:r>
+                        <a:rPr lang="en-US" sz="1400" i="0" dirty="0">
+                          <a:solidFill>
+                            <a:schemeClr val="bg2">
+                              <a:lumMod val="50000"/>
+                            </a:schemeClr>
+                          </a:solidFill>
+                        </a:rPr>
+                        <a:t> y leer </a:t>
+                      </a:r>
+                      <a:r>
+                        <a:rPr lang="en-US" sz="1400" i="0" dirty="0" err="1">
+                          <a:solidFill>
+                            <a:schemeClr val="bg2">
+                              <a:lumMod val="50000"/>
+                            </a:schemeClr>
+                          </a:solidFill>
+                        </a:rPr>
+                        <a:t>comentarios</a:t>
+                      </a:r>
+                      <a:r>
+                        <a:rPr lang="en-US" sz="1400" i="0" dirty="0">
+                          <a:solidFill>
+                            <a:schemeClr val="bg2">
+                              <a:lumMod val="50000"/>
+                            </a:schemeClr>
+                          </a:solidFill>
+                        </a:rPr>
+                        <a:t> </a:t>
+                      </a:r>
+                      <a:r>
+                        <a:rPr lang="en-US" sz="1400" i="0" dirty="0" err="1">
+                          <a:solidFill>
+                            <a:schemeClr val="bg2">
+                              <a:lumMod val="50000"/>
+                            </a:schemeClr>
+                          </a:solidFill>
+                        </a:rPr>
+                        <a:t>sobre</a:t>
+                      </a:r>
+                      <a:r>
+                        <a:rPr lang="en-US" sz="1400" i="0" dirty="0">
+                          <a:solidFill>
+                            <a:schemeClr val="bg2">
+                              <a:lumMod val="50000"/>
+                            </a:schemeClr>
+                          </a:solidFill>
+                        </a:rPr>
+                        <a:t> </a:t>
+                      </a:r>
+                      <a:r>
+                        <a:rPr lang="en-US" sz="1400" i="0" dirty="0" err="1">
+                          <a:solidFill>
+                            <a:schemeClr val="bg2">
+                              <a:lumMod val="50000"/>
+                            </a:schemeClr>
+                          </a:solidFill>
+                        </a:rPr>
+                        <a:t>usuarios</a:t>
+                      </a:r>
+                      <a:r>
+                        <a:rPr lang="en-US" sz="1400" i="0" dirty="0">
+                          <a:solidFill>
+                            <a:schemeClr val="bg2">
+                              <a:lumMod val="50000"/>
+                            </a:schemeClr>
+                          </a:solidFill>
+                        </a:rPr>
+                        <a:t> </a:t>
+                      </a:r>
+                      <a:r>
+                        <a:rPr lang="en-US" sz="1400" i="0" dirty="0" err="1">
+                          <a:solidFill>
+                            <a:schemeClr val="bg2">
+                              <a:lumMod val="50000"/>
+                            </a:schemeClr>
+                          </a:solidFill>
+                        </a:rPr>
+                        <a:t>anteriores</a:t>
+                      </a:r>
+                      <a:endParaRPr lang="en-US" sz="1400" i="0" dirty="0">
+                        <a:solidFill>
+                          <a:schemeClr val="bg2">
+                            <a:lumMod val="50000"/>
+                          </a:schemeClr>
+                        </a:solidFill>
+                      </a:endParaRPr>
+                    </a:p>
+                    <a:p>
+                      <a:pPr marL="285750" indent="-285750" algn="l">
+                        <a:buFont typeface="Arial" panose="020B0604020202020204" pitchFamily="34" charset="0"/>
+                        <a:buChar char="•"/>
+                      </a:pPr>
+                      <a:endParaRPr lang="en-US" sz="1400" i="0" dirty="0">
+                        <a:solidFill>
+                          <a:schemeClr val="bg2">
+                            <a:lumMod val="50000"/>
+                          </a:schemeClr>
+                        </a:solidFill>
+                      </a:endParaRPr>
                     </a:p>
                     <a:p>
                       <a:pPr marL="0" indent="0" algn="l">
@@ -3822,14 +3739,474 @@
                         <a:defRPr/>
                       </a:pPr>
                       <a:r>
-                        <a:rPr lang="en-US" sz="1400" i="0" dirty="0">
-                          <a:solidFill>
-                            <a:schemeClr val="bg2">
-                              <a:lumMod val="50000"/>
-                            </a:schemeClr>
-                          </a:solidFill>
-                        </a:rPr>
-                        <a:t>List all negative feedback </a:t>
+                        <a:rPr lang="en-US" sz="1400" i="0" dirty="0" err="1">
+                          <a:solidFill>
+                            <a:schemeClr val="bg2">
+                              <a:lumMod val="50000"/>
+                            </a:schemeClr>
+                          </a:solidFill>
+                        </a:rPr>
+                        <a:t>Disponibilidad</a:t>
+                      </a:r>
+                      <a:r>
+                        <a:rPr lang="en-US" sz="1400" i="0" dirty="0">
+                          <a:solidFill>
+                            <a:schemeClr val="bg2">
+                              <a:lumMod val="50000"/>
+                            </a:schemeClr>
+                          </a:solidFill>
+                        </a:rPr>
+                        <a:t> </a:t>
+                      </a:r>
+                      <a:r>
+                        <a:rPr lang="en-US" sz="1400" i="0" dirty="0" err="1">
+                          <a:solidFill>
+                            <a:schemeClr val="bg2">
+                              <a:lumMod val="50000"/>
+                            </a:schemeClr>
+                          </a:solidFill>
+                        </a:rPr>
+                        <a:t>en</a:t>
+                      </a:r>
+                      <a:r>
+                        <a:rPr lang="en-US" sz="1400" i="0" dirty="0">
+                          <a:solidFill>
+                            <a:schemeClr val="bg2">
+                              <a:lumMod val="50000"/>
+                            </a:schemeClr>
+                          </a:solidFill>
+                        </a:rPr>
+                        <a:t> </a:t>
+                      </a:r>
+                      <a:r>
+                        <a:rPr lang="en-US" sz="1400" i="0" dirty="0" err="1">
+                          <a:solidFill>
+                            <a:schemeClr val="bg2">
+                              <a:lumMod val="50000"/>
+                            </a:schemeClr>
+                          </a:solidFill>
+                        </a:rPr>
+                        <a:t>dispositivos</a:t>
+                      </a:r>
+                      <a:r>
+                        <a:rPr lang="en-US" sz="1400" i="0" dirty="0">
+                          <a:solidFill>
+                            <a:schemeClr val="bg2">
+                              <a:lumMod val="50000"/>
+                            </a:schemeClr>
+                          </a:solidFill>
+                        </a:rPr>
+                        <a:t> </a:t>
+                      </a:r>
+                      <a:r>
+                        <a:rPr lang="en-US" sz="1400" i="0" dirty="0" err="1">
+                          <a:solidFill>
+                            <a:schemeClr val="bg2">
+                              <a:lumMod val="50000"/>
+                            </a:schemeClr>
+                          </a:solidFill>
+                        </a:rPr>
+                        <a:t>portátiles</a:t>
+                      </a:r>
+                      <a:endParaRPr lang="en-US" sz="1400" i="0" dirty="0">
+                        <a:solidFill>
+                          <a:schemeClr val="bg2">
+                            <a:lumMod val="50000"/>
+                          </a:schemeClr>
+                        </a:solidFill>
+                      </a:endParaRPr>
+                    </a:p>
+                    <a:p>
+                      <a:pPr marL="285750" marR="0" lvl="0" indent="-285750" algn="l" defTabSz="914400" rtl="0" eaLnBrk="1" fontAlgn="auto" latinLnBrk="0" hangingPunct="1">
+                        <a:lnSpc>
+                          <a:spcPct val="100000"/>
+                        </a:lnSpc>
+                        <a:spcBef>
+                          <a:spcPts val="0"/>
+                        </a:spcBef>
+                        <a:spcAft>
+                          <a:spcPts val="0"/>
+                        </a:spcAft>
+                        <a:buClrTx/>
+                        <a:buSzTx/>
+                        <a:buFont typeface="Arial" panose="020B0604020202020204" pitchFamily="34" charset="0"/>
+                        <a:buChar char="•"/>
+                        <a:tabLst/>
+                        <a:defRPr/>
+                      </a:pPr>
+                      <a:r>
+                        <a:rPr lang="en-US" sz="1400" i="0" dirty="0">
+                          <a:solidFill>
+                            <a:schemeClr val="bg2">
+                              <a:lumMod val="50000"/>
+                            </a:schemeClr>
+                          </a:solidFill>
+                        </a:rPr>
+                        <a:t>No </a:t>
+                      </a:r>
+                      <a:r>
+                        <a:rPr lang="en-US" sz="1400" i="0" dirty="0" err="1">
+                          <a:solidFill>
+                            <a:schemeClr val="bg2">
+                              <a:lumMod val="50000"/>
+                            </a:schemeClr>
+                          </a:solidFill>
+                        </a:rPr>
+                        <a:t>está</a:t>
+                      </a:r>
+                      <a:r>
+                        <a:rPr lang="en-US" sz="1400" i="0" dirty="0">
+                          <a:solidFill>
+                            <a:schemeClr val="bg2">
+                              <a:lumMod val="50000"/>
+                            </a:schemeClr>
+                          </a:solidFill>
+                        </a:rPr>
+                        <a:t> </a:t>
+                      </a:r>
+                      <a:r>
+                        <a:rPr lang="en-US" sz="1400" i="0" dirty="0" err="1">
+                          <a:solidFill>
+                            <a:schemeClr val="bg2">
+                              <a:lumMod val="50000"/>
+                            </a:schemeClr>
+                          </a:solidFill>
+                        </a:rPr>
+                        <a:t>adaptada</a:t>
+                      </a:r>
+                      <a:r>
+                        <a:rPr lang="en-US" sz="1400" i="0" dirty="0">
+                          <a:solidFill>
+                            <a:schemeClr val="bg2">
+                              <a:lumMod val="50000"/>
+                            </a:schemeClr>
+                          </a:solidFill>
+                        </a:rPr>
+                        <a:t> para la </a:t>
+                      </a:r>
+                      <a:r>
+                        <a:rPr lang="en-US" sz="1400" i="0" dirty="0" err="1">
+                          <a:solidFill>
+                            <a:schemeClr val="bg2">
+                              <a:lumMod val="50000"/>
+                            </a:schemeClr>
+                          </a:solidFill>
+                        </a:rPr>
+                        <a:t>comunidad</a:t>
+                      </a:r>
+                      <a:r>
+                        <a:rPr lang="en-US" sz="1400" i="0" dirty="0">
+                          <a:solidFill>
+                            <a:schemeClr val="bg2">
+                              <a:lumMod val="50000"/>
+                            </a:schemeClr>
+                          </a:solidFill>
+                        </a:rPr>
+                        <a:t> </a:t>
+                      </a:r>
+                      <a:r>
+                        <a:rPr lang="en-US" sz="1400" i="0" dirty="0" err="1">
+                          <a:solidFill>
+                            <a:schemeClr val="bg2">
+                              <a:lumMod val="50000"/>
+                            </a:schemeClr>
+                          </a:solidFill>
+                        </a:rPr>
+                        <a:t>minusválida</a:t>
+                      </a:r>
+                      <a:endParaRPr lang="en-US" sz="1400" i="0" dirty="0">
+                        <a:solidFill>
+                          <a:schemeClr val="bg2">
+                            <a:lumMod val="50000"/>
+                          </a:schemeClr>
+                        </a:solidFill>
+                      </a:endParaRPr>
+                    </a:p>
+                    <a:p>
+                      <a:pPr marL="285750" marR="0" lvl="0" indent="-285750" algn="l" defTabSz="914400" rtl="0" eaLnBrk="1" fontAlgn="auto" latinLnBrk="0" hangingPunct="1">
+                        <a:lnSpc>
+                          <a:spcPct val="100000"/>
+                        </a:lnSpc>
+                        <a:spcBef>
+                          <a:spcPts val="0"/>
+                        </a:spcBef>
+                        <a:spcAft>
+                          <a:spcPts val="0"/>
+                        </a:spcAft>
+                        <a:buClrTx/>
+                        <a:buSzTx/>
+                        <a:buFont typeface="Arial" panose="020B0604020202020204" pitchFamily="34" charset="0"/>
+                        <a:buChar char="•"/>
+                        <a:tabLst/>
+                        <a:defRPr/>
+                      </a:pPr>
+                      <a:r>
+                        <a:rPr lang="en-US" sz="1400" i="0" dirty="0" err="1">
+                          <a:solidFill>
+                            <a:schemeClr val="bg2">
+                              <a:lumMod val="50000"/>
+                            </a:schemeClr>
+                          </a:solidFill>
+                        </a:rPr>
+                        <a:t>Plurilingüidad</a:t>
+                      </a:r>
+                      <a:r>
+                        <a:rPr lang="en-US" sz="1400" i="0" dirty="0">
+                          <a:solidFill>
+                            <a:schemeClr val="bg2">
+                              <a:lumMod val="50000"/>
+                            </a:schemeClr>
+                          </a:solidFill>
+                        </a:rPr>
+                        <a:t> </a:t>
+                      </a:r>
+                      <a:r>
+                        <a:rPr lang="en-US" sz="1400" i="0" dirty="0" err="1">
+                          <a:solidFill>
+                            <a:schemeClr val="bg2">
+                              <a:lumMod val="50000"/>
+                            </a:schemeClr>
+                          </a:solidFill>
+                        </a:rPr>
+                        <a:t>muy</a:t>
+                      </a:r>
+                      <a:r>
+                        <a:rPr lang="en-US" sz="1400" i="0" dirty="0">
+                          <a:solidFill>
+                            <a:schemeClr val="bg2">
+                              <a:lumMod val="50000"/>
+                            </a:schemeClr>
+                          </a:solidFill>
+                        </a:rPr>
+                        <a:t> </a:t>
+                      </a:r>
+                      <a:r>
+                        <a:rPr lang="en-US" sz="1400" i="0" dirty="0" err="1">
+                          <a:solidFill>
+                            <a:schemeClr val="bg2">
+                              <a:lumMod val="50000"/>
+                            </a:schemeClr>
+                          </a:solidFill>
+                        </a:rPr>
+                        <a:t>escasa</a:t>
+                      </a:r>
+                      <a:r>
+                        <a:rPr lang="en-US" sz="1400" i="0" dirty="0">
+                          <a:solidFill>
+                            <a:schemeClr val="bg2">
+                              <a:lumMod val="50000"/>
+                            </a:schemeClr>
+                          </a:solidFill>
+                        </a:rPr>
+                        <a:t> (</a:t>
+                      </a:r>
+                      <a:r>
+                        <a:rPr lang="en-US" sz="1400" i="0" dirty="0" err="1">
+                          <a:solidFill>
+                            <a:schemeClr val="bg2">
+                              <a:lumMod val="50000"/>
+                            </a:schemeClr>
+                          </a:solidFill>
+                        </a:rPr>
+                        <a:t>Inglés</a:t>
+                      </a:r>
+                      <a:r>
+                        <a:rPr lang="en-US" sz="1400" i="0" dirty="0">
+                          <a:solidFill>
+                            <a:schemeClr val="bg2">
+                              <a:lumMod val="50000"/>
+                            </a:schemeClr>
+                          </a:solidFill>
+                        </a:rPr>
+                        <a:t> - </a:t>
+                      </a:r>
+                      <a:r>
+                        <a:rPr lang="en-US" sz="1400" i="0" dirty="0" err="1">
+                          <a:solidFill>
+                            <a:schemeClr val="bg2">
+                              <a:lumMod val="50000"/>
+                            </a:schemeClr>
+                          </a:solidFill>
+                        </a:rPr>
+                        <a:t>Español</a:t>
+                      </a:r>
+                      <a:r>
+                        <a:rPr lang="en-US" sz="1400" i="0" dirty="0">
+                          <a:solidFill>
+                            <a:schemeClr val="bg2">
+                              <a:lumMod val="50000"/>
+                            </a:schemeClr>
+                          </a:solidFill>
+                        </a:rPr>
+                        <a:t>)</a:t>
+                      </a:r>
+                    </a:p>
+                    <a:p>
+                      <a:pPr marL="285750" marR="0" lvl="0" indent="-285750" algn="l" defTabSz="914400" rtl="0" eaLnBrk="1" fontAlgn="auto" latinLnBrk="0" hangingPunct="1">
+                        <a:lnSpc>
+                          <a:spcPct val="100000"/>
+                        </a:lnSpc>
+                        <a:spcBef>
+                          <a:spcPts val="0"/>
+                        </a:spcBef>
+                        <a:spcAft>
+                          <a:spcPts val="0"/>
+                        </a:spcAft>
+                        <a:buClrTx/>
+                        <a:buSzTx/>
+                        <a:buFont typeface="Arial" panose="020B0604020202020204" pitchFamily="34" charset="0"/>
+                        <a:buChar char="•"/>
+                        <a:tabLst/>
+                        <a:defRPr/>
+                      </a:pPr>
+                      <a:r>
+                        <a:rPr lang="en-US" sz="1400" i="0" dirty="0" err="1">
+                          <a:solidFill>
+                            <a:schemeClr val="bg2">
+                              <a:lumMod val="50000"/>
+                            </a:schemeClr>
+                          </a:solidFill>
+                        </a:rPr>
+                        <a:t>Escaso</a:t>
+                      </a:r>
+                      <a:r>
+                        <a:rPr lang="en-US" sz="1400" i="0" dirty="0">
+                          <a:solidFill>
+                            <a:schemeClr val="bg2">
+                              <a:lumMod val="50000"/>
+                            </a:schemeClr>
+                          </a:solidFill>
+                        </a:rPr>
+                        <a:t> </a:t>
+                      </a:r>
+                      <a:r>
+                        <a:rPr lang="en-US" sz="1400" i="0" dirty="0" err="1">
+                          <a:solidFill>
+                            <a:schemeClr val="bg2">
+                              <a:lumMod val="50000"/>
+                            </a:schemeClr>
+                          </a:solidFill>
+                        </a:rPr>
+                        <a:t>servicio</a:t>
+                      </a:r>
+                      <a:r>
+                        <a:rPr lang="en-US" sz="1400" i="0" dirty="0">
+                          <a:solidFill>
+                            <a:schemeClr val="bg2">
+                              <a:lumMod val="50000"/>
+                            </a:schemeClr>
+                          </a:solidFill>
+                        </a:rPr>
+                        <a:t> de </a:t>
+                      </a:r>
+                      <a:r>
+                        <a:rPr lang="en-US" sz="1400" i="0" dirty="0" err="1">
+                          <a:solidFill>
+                            <a:schemeClr val="bg2">
+                              <a:lumMod val="50000"/>
+                            </a:schemeClr>
+                          </a:solidFill>
+                        </a:rPr>
+                        <a:t>asistencia</a:t>
+                      </a:r>
+                      <a:r>
+                        <a:rPr lang="en-US" sz="1400" i="0" dirty="0">
+                          <a:solidFill>
+                            <a:schemeClr val="bg2">
+                              <a:lumMod val="50000"/>
+                            </a:schemeClr>
+                          </a:solidFill>
+                        </a:rPr>
+                        <a:t> Web</a:t>
+                      </a:r>
+                    </a:p>
+                    <a:p>
+                      <a:pPr marL="285750" marR="0" lvl="0" indent="-285750" algn="l" defTabSz="914400" rtl="0" eaLnBrk="1" fontAlgn="auto" latinLnBrk="0" hangingPunct="1">
+                        <a:lnSpc>
+                          <a:spcPct val="100000"/>
+                        </a:lnSpc>
+                        <a:spcBef>
+                          <a:spcPts val="0"/>
+                        </a:spcBef>
+                        <a:spcAft>
+                          <a:spcPts val="0"/>
+                        </a:spcAft>
+                        <a:buClrTx/>
+                        <a:buSzTx/>
+                        <a:buFont typeface="Arial" panose="020B0604020202020204" pitchFamily="34" charset="0"/>
+                        <a:buChar char="•"/>
+                        <a:tabLst/>
+                        <a:defRPr/>
+                      </a:pPr>
+                      <a:r>
+                        <a:rPr lang="en-US" sz="1400" i="0" dirty="0" err="1">
+                          <a:solidFill>
+                            <a:schemeClr val="bg2">
+                              <a:lumMod val="50000"/>
+                            </a:schemeClr>
+                          </a:solidFill>
+                        </a:rPr>
+                        <a:t>Imposibilidad</a:t>
+                      </a:r>
+                      <a:r>
+                        <a:rPr lang="en-US" sz="1400" i="0" dirty="0">
+                          <a:solidFill>
+                            <a:schemeClr val="bg2">
+                              <a:lumMod val="50000"/>
+                            </a:schemeClr>
+                          </a:solidFill>
+                        </a:rPr>
+                        <a:t> de </a:t>
+                      </a:r>
+                      <a:r>
+                        <a:rPr lang="en-US" sz="1400" i="0" dirty="0" err="1">
+                          <a:solidFill>
+                            <a:schemeClr val="bg2">
+                              <a:lumMod val="50000"/>
+                            </a:schemeClr>
+                          </a:solidFill>
+                        </a:rPr>
+                        <a:t>realizar</a:t>
+                      </a:r>
+                      <a:r>
+                        <a:rPr lang="en-US" sz="1400" i="0" dirty="0">
+                          <a:solidFill>
+                            <a:schemeClr val="bg2">
+                              <a:lumMod val="50000"/>
+                            </a:schemeClr>
+                          </a:solidFill>
+                        </a:rPr>
+                        <a:t> </a:t>
+                      </a:r>
+                      <a:r>
+                        <a:rPr lang="en-US" sz="1400" i="0" dirty="0" err="1">
+                          <a:solidFill>
+                            <a:schemeClr val="bg2">
+                              <a:lumMod val="50000"/>
+                            </a:schemeClr>
+                          </a:solidFill>
+                        </a:rPr>
+                        <a:t>búsquedas</a:t>
+                      </a:r>
+                      <a:r>
+                        <a:rPr lang="en-US" sz="1400" i="0" dirty="0">
+                          <a:solidFill>
+                            <a:schemeClr val="bg2">
+                              <a:lumMod val="50000"/>
+                            </a:schemeClr>
+                          </a:solidFill>
+                        </a:rPr>
+                        <a:t> </a:t>
+                      </a:r>
+                      <a:r>
+                        <a:rPr lang="en-US" sz="1400" i="0" dirty="0" err="1">
+                          <a:solidFill>
+                            <a:schemeClr val="bg2">
+                              <a:lumMod val="50000"/>
+                            </a:schemeClr>
+                          </a:solidFill>
+                        </a:rPr>
+                        <a:t>personalizadas</a:t>
                       </a:r>
                       <a:endParaRPr lang="en-US" sz="1400" i="0" dirty="0"/>
                     </a:p>
@@ -3853,7 +4230,7 @@
                   </a:ext>
                 </a:extLst>
               </a:tr>
-              <a:tr h="0">
+              <a:tr h="520797">
                 <a:tc>
                   <a:txBody>
                     <a:bodyPr/>
@@ -3861,13 +4238,50 @@
                     <a:p>
                       <a:pPr algn="ctr"/>
                       <a:r>
+                        <a:rPr lang="en-US" sz="1800" b="1" dirty="0" err="1">
+                          <a:solidFill>
+                            <a:schemeClr val="bg1"/>
+                          </a:solidFill>
+                        </a:rPr>
+                        <a:t>Preguntas</a:t>
+                      </a:r>
+                      <a:r>
                         <a:rPr lang="en-US" sz="1800" b="1" dirty="0">
                           <a:solidFill>
                             <a:schemeClr val="bg1"/>
                           </a:solidFill>
                         </a:rPr>
-                        <a:t>Questions</a:t>
-                      </a:r>
+                        <a:t> a </a:t>
+                      </a:r>
+                      <a:r>
+                        <a:rPr lang="en-US" sz="1800" b="1" dirty="0" err="1">
+                          <a:solidFill>
+                            <a:schemeClr val="bg1"/>
+                          </a:solidFill>
+                        </a:rPr>
+                        <a:t>partir</a:t>
+                      </a:r>
+                      <a:r>
+                        <a:rPr lang="en-US" sz="1800" b="1" dirty="0">
+                          <a:solidFill>
+                            <a:schemeClr val="bg1"/>
+                          </a:solidFill>
+                        </a:rPr>
+                        <a:t> de la </a:t>
+                      </a:r>
+                      <a:r>
+                        <a:rPr lang="en-US" sz="1800" b="1" dirty="0" err="1">
+                          <a:solidFill>
+                            <a:schemeClr val="bg1"/>
+                          </a:solidFill>
+                        </a:rPr>
+                        <a:t>experiencia</a:t>
+                      </a:r>
+                      <a:endParaRPr lang="en-US" sz="1800" b="1" dirty="0">
+                        <a:solidFill>
+                          <a:schemeClr val="bg1"/>
+                        </a:solidFill>
+                      </a:endParaRPr>
                     </a:p>
                   </a:txBody>
                   <a:tcPr marL="249718" marR="249718" marT="124859" marB="124859" anchor="ctr">
@@ -3888,7 +4302,7 @@
                             <a:schemeClr val="bg1"/>
                           </a:solidFill>
                         </a:rPr>
-                        <a:t>Ideas</a:t>
+                        <a:t>Nueva Ideas</a:t>
                       </a:r>
                     </a:p>
                   </a:txBody>
@@ -3904,7 +4318,7 @@
                   </a:ext>
                 </a:extLst>
               </a:tr>
-              <a:tr h="2261775">
+              <a:tr h="2580619">
                 <a:tc>
                   <a:txBody>
                     <a:bodyPr/>
@@ -3935,11 +4349,111 @@
                             </a:schemeClr>
                           </a:solidFill>
                         </a:rPr>
-                        <a:t>List all questions raised</a:t>
+                        <a:t>¿</a:t>
+                      </a:r>
+                      <a:r>
+                        <a:rPr lang="en-US" sz="1400" i="0" dirty="0" err="1">
+                          <a:solidFill>
+                            <a:schemeClr val="bg2">
+                              <a:lumMod val="50000"/>
+                            </a:schemeClr>
+                          </a:solidFill>
+                        </a:rPr>
+                        <a:t>Puedo</a:t>
+                      </a:r>
+                      <a:r>
+                        <a:rPr lang="en-US" sz="1400" i="0" dirty="0">
+                          <a:solidFill>
+                            <a:schemeClr val="bg2">
+                              <a:lumMod val="50000"/>
+                            </a:schemeClr>
+                          </a:solidFill>
+                        </a:rPr>
+                        <a:t> </a:t>
+                      </a:r>
+                      <a:r>
+                        <a:rPr lang="en-US" sz="1400" i="0" dirty="0" err="1">
+                          <a:solidFill>
+                            <a:schemeClr val="bg2">
+                              <a:lumMod val="50000"/>
+                            </a:schemeClr>
+                          </a:solidFill>
+                        </a:rPr>
+                        <a:t>cambiar</a:t>
+                      </a:r>
+                      <a:r>
+                        <a:rPr lang="en-US" sz="1400" i="0" dirty="0">
+                          <a:solidFill>
+                            <a:schemeClr val="bg2">
+                              <a:lumMod val="50000"/>
+                            </a:schemeClr>
+                          </a:solidFill>
+                        </a:rPr>
+                        <a:t> la </a:t>
+                      </a:r>
+                      <a:r>
+                        <a:rPr lang="en-US" sz="1400" i="0" dirty="0" err="1">
+                          <a:solidFill>
+                            <a:schemeClr val="bg2">
+                              <a:lumMod val="50000"/>
+                            </a:schemeClr>
+                          </a:solidFill>
+                        </a:rPr>
+                        <a:t>apariencia</a:t>
+                      </a:r>
+                      <a:r>
+                        <a:rPr lang="en-US" sz="1400" i="0" dirty="0">
+                          <a:solidFill>
+                            <a:schemeClr val="bg2">
+                              <a:lumMod val="50000"/>
+                            </a:schemeClr>
+                          </a:solidFill>
+                        </a:rPr>
+                        <a:t> de la </a:t>
+                      </a:r>
+                      <a:r>
+                        <a:rPr lang="en-US" sz="1400" i="0" dirty="0" err="1">
+                          <a:solidFill>
+                            <a:schemeClr val="bg2">
+                              <a:lumMod val="50000"/>
+                            </a:schemeClr>
+                          </a:solidFill>
+                        </a:rPr>
+                        <a:t>página</a:t>
+                      </a:r>
+                      <a:r>
+                        <a:rPr lang="en-US" sz="1400" i="0" dirty="0">
+                          <a:solidFill>
+                            <a:schemeClr val="bg2">
+                              <a:lumMod val="50000"/>
+                            </a:schemeClr>
+                          </a:solidFill>
+                        </a:rPr>
+                        <a:t> de forma que no </a:t>
+                      </a:r>
+                      <a:r>
+                        <a:rPr lang="en-US" sz="1400" i="0" dirty="0" err="1">
+                          <a:solidFill>
+                            <a:schemeClr val="bg2">
+                              <a:lumMod val="50000"/>
+                            </a:schemeClr>
+                          </a:solidFill>
+                        </a:rPr>
+                        <a:t>canse</a:t>
+                      </a:r>
+                      <a:r>
+                        <a:rPr lang="en-US" sz="1400" i="0" dirty="0">
+                          <a:solidFill>
+                            <a:schemeClr val="bg2">
+                              <a:lumMod val="50000"/>
+                            </a:schemeClr>
+                          </a:solidFill>
+                        </a:rPr>
+                        <a:t> a la vista?</a:t>
                       </a:r>
                     </a:p>
                     <a:p>
-                      <a:pPr marL="0" marR="0" lvl="0" indent="0" algn="l" defTabSz="914400" rtl="0" eaLnBrk="1" fontAlgn="auto" latinLnBrk="0" hangingPunct="1">
+                      <a:pPr marL="285750" marR="0" lvl="0" indent="-285750" algn="l" defTabSz="914400" rtl="0" eaLnBrk="1" fontAlgn="auto" latinLnBrk="0" hangingPunct="1">
                         <a:lnSpc>
                           <a:spcPct val="100000"/>
                         </a:lnSpc>
@@ -3952,7 +4466,454 @@
                         <a:buClrTx/>
                         <a:buSzTx/>
                         <a:buFont typeface="Arial" panose="020B0604020202020204" pitchFamily="34" charset="0"/>
-                        <a:buNone/>
+                        <a:buChar char="•"/>
+                        <a:tabLst/>
+                        <a:defRPr/>
+                      </a:pPr>
+                      <a:r>
+                        <a:rPr lang="en-US" sz="1400" i="0" dirty="0">
+                          <a:solidFill>
+                            <a:schemeClr val="bg2">
+                              <a:lumMod val="50000"/>
+                            </a:schemeClr>
+                          </a:solidFill>
+                        </a:rPr>
+                        <a:t>¿</a:t>
+                      </a:r>
+                      <a:r>
+                        <a:rPr lang="en-US" sz="1400" i="0" dirty="0" err="1">
+                          <a:solidFill>
+                            <a:schemeClr val="bg2">
+                              <a:lumMod val="50000"/>
+                            </a:schemeClr>
+                          </a:solidFill>
+                        </a:rPr>
+                        <a:t>Puedo</a:t>
+                      </a:r>
+                      <a:r>
+                        <a:rPr lang="en-US" sz="1400" i="0" dirty="0">
+                          <a:solidFill>
+                            <a:schemeClr val="bg2">
+                              <a:lumMod val="50000"/>
+                            </a:schemeClr>
+                          </a:solidFill>
+                        </a:rPr>
+                        <a:t> </a:t>
+                      </a:r>
+                      <a:r>
+                        <a:rPr lang="en-US" sz="1400" i="0" dirty="0" err="1">
+                          <a:solidFill>
+                            <a:schemeClr val="bg2">
+                              <a:lumMod val="50000"/>
+                            </a:schemeClr>
+                          </a:solidFill>
+                        </a:rPr>
+                        <a:t>buscar</a:t>
+                      </a:r>
+                      <a:r>
+                        <a:rPr lang="en-US" sz="1400" i="0" dirty="0">
+                          <a:solidFill>
+                            <a:schemeClr val="bg2">
+                              <a:lumMod val="50000"/>
+                            </a:schemeClr>
+                          </a:solidFill>
+                        </a:rPr>
+                        <a:t> </a:t>
+                      </a:r>
+                      <a:r>
+                        <a:rPr lang="en-US" sz="1400" i="0" dirty="0" err="1">
+                          <a:solidFill>
+                            <a:schemeClr val="bg2">
+                              <a:lumMod val="50000"/>
+                            </a:schemeClr>
+                          </a:solidFill>
+                        </a:rPr>
+                        <a:t>lugares</a:t>
+                      </a:r>
+                      <a:r>
+                        <a:rPr lang="en-US" sz="1400" i="0" dirty="0">
+                          <a:solidFill>
+                            <a:schemeClr val="bg2">
+                              <a:lumMod val="50000"/>
+                            </a:schemeClr>
+                          </a:solidFill>
+                        </a:rPr>
+                        <a:t> </a:t>
+                      </a:r>
+                      <a:r>
+                        <a:rPr lang="en-US" sz="1400" i="0" dirty="0" err="1">
+                          <a:solidFill>
+                            <a:schemeClr val="bg2">
+                              <a:lumMod val="50000"/>
+                            </a:schemeClr>
+                          </a:solidFill>
+                        </a:rPr>
+                        <a:t>adaptados</a:t>
+                      </a:r>
+                      <a:r>
+                        <a:rPr lang="en-US" sz="1400" i="0" dirty="0">
+                          <a:solidFill>
+                            <a:schemeClr val="bg2">
+                              <a:lumMod val="50000"/>
+                            </a:schemeClr>
+                          </a:solidFill>
+                        </a:rPr>
+                        <a:t> a mi </a:t>
+                      </a:r>
+                      <a:r>
+                        <a:rPr lang="en-US" sz="1400" i="0" dirty="0" err="1">
+                          <a:solidFill>
+                            <a:schemeClr val="bg2">
+                              <a:lumMod val="50000"/>
+                            </a:schemeClr>
+                          </a:solidFill>
+                        </a:rPr>
+                        <a:t>minusvalía</a:t>
+                      </a:r>
+                      <a:r>
+                        <a:rPr lang="en-US" sz="1400" i="0" dirty="0">
+                          <a:solidFill>
+                            <a:schemeClr val="bg2">
+                              <a:lumMod val="50000"/>
+                            </a:schemeClr>
+                          </a:solidFill>
+                        </a:rPr>
+                        <a:t>?</a:t>
+                      </a:r>
+                    </a:p>
+                    <a:p>
+                      <a:pPr marL="285750" marR="0" lvl="0" indent="-285750" algn="l" defTabSz="914400" rtl="0" eaLnBrk="1" fontAlgn="auto" latinLnBrk="0" hangingPunct="1">
+                        <a:lnSpc>
+                          <a:spcPct val="100000"/>
+                        </a:lnSpc>
+                        <a:spcBef>
+                          <a:spcPts val="0"/>
+                        </a:spcBef>
+                        <a:spcAft>
+                          <a:spcPts val="0"/>
+                        </a:spcAft>
+                        <a:buClrTx/>
+                        <a:buSzTx/>
+                        <a:buFont typeface="Arial" panose="020B0604020202020204" pitchFamily="34" charset="0"/>
+                        <a:buChar char="•"/>
+                        <a:tabLst/>
+                        <a:defRPr/>
+                      </a:pPr>
+                      <a:r>
+                        <a:rPr lang="en-US" sz="1400" i="0" dirty="0">
+                          <a:solidFill>
+                            <a:schemeClr val="bg2">
+                              <a:lumMod val="50000"/>
+                            </a:schemeClr>
+                          </a:solidFill>
+                        </a:rPr>
+                        <a:t>¿</a:t>
+                      </a:r>
+                      <a:r>
+                        <a:rPr lang="en-US" sz="1400" i="0" dirty="0" err="1">
+                          <a:solidFill>
+                            <a:schemeClr val="bg2">
+                              <a:lumMod val="50000"/>
+                            </a:schemeClr>
+                          </a:solidFill>
+                        </a:rPr>
+                        <a:t>Puedo</a:t>
+                      </a:r>
+                      <a:r>
+                        <a:rPr lang="en-US" sz="1400" i="0" dirty="0">
+                          <a:solidFill>
+                            <a:schemeClr val="bg2">
+                              <a:lumMod val="50000"/>
+                            </a:schemeClr>
+                          </a:solidFill>
+                        </a:rPr>
+                        <a:t> </a:t>
+                      </a:r>
+                      <a:r>
+                        <a:rPr lang="en-US" sz="1400" i="0" dirty="0" err="1">
+                          <a:solidFill>
+                            <a:schemeClr val="bg2">
+                              <a:lumMod val="50000"/>
+                            </a:schemeClr>
+                          </a:solidFill>
+                        </a:rPr>
+                        <a:t>registrarme</a:t>
+                      </a:r>
+                      <a:r>
+                        <a:rPr lang="en-US" sz="1400" i="0" dirty="0">
+                          <a:solidFill>
+                            <a:schemeClr val="bg2">
+                              <a:lumMod val="50000"/>
+                            </a:schemeClr>
+                          </a:solidFill>
+                        </a:rPr>
+                        <a:t> y </a:t>
+                      </a:r>
+                      <a:r>
+                        <a:rPr lang="en-US" sz="1400" i="0" dirty="0" err="1">
+                          <a:solidFill>
+                            <a:schemeClr val="bg2">
+                              <a:lumMod val="50000"/>
+                            </a:schemeClr>
+                          </a:solidFill>
+                        </a:rPr>
+                        <a:t>guardar</a:t>
+                      </a:r>
+                      <a:r>
+                        <a:rPr lang="en-US" sz="1400" i="0" dirty="0">
+                          <a:solidFill>
+                            <a:schemeClr val="bg2">
+                              <a:lumMod val="50000"/>
+                            </a:schemeClr>
+                          </a:solidFill>
+                        </a:rPr>
+                        <a:t> </a:t>
+                      </a:r>
+                      <a:r>
+                        <a:rPr lang="en-US" sz="1400" i="0" dirty="0" err="1">
+                          <a:solidFill>
+                            <a:schemeClr val="bg2">
+                              <a:lumMod val="50000"/>
+                            </a:schemeClr>
+                          </a:solidFill>
+                        </a:rPr>
+                        <a:t>toda</a:t>
+                      </a:r>
+                      <a:r>
+                        <a:rPr lang="en-US" sz="1400" i="0" dirty="0">
+                          <a:solidFill>
+                            <a:schemeClr val="bg2">
+                              <a:lumMod val="50000"/>
+                            </a:schemeClr>
+                          </a:solidFill>
+                        </a:rPr>
+                        <a:t> la </a:t>
+                      </a:r>
+                      <a:r>
+                        <a:rPr lang="en-US" sz="1400" i="0" dirty="0" err="1">
+                          <a:solidFill>
+                            <a:schemeClr val="bg2">
+                              <a:lumMod val="50000"/>
+                            </a:schemeClr>
+                          </a:solidFill>
+                        </a:rPr>
+                        <a:t>información</a:t>
+                      </a:r>
+                      <a:r>
+                        <a:rPr lang="en-US" sz="1400" i="0" dirty="0">
+                          <a:solidFill>
+                            <a:schemeClr val="bg2">
+                              <a:lumMod val="50000"/>
+                            </a:schemeClr>
+                          </a:solidFill>
+                        </a:rPr>
+                        <a:t> que he </a:t>
+                      </a:r>
+                      <a:r>
+                        <a:rPr lang="en-US" sz="1400" i="0" dirty="0" err="1">
+                          <a:solidFill>
+                            <a:schemeClr val="bg2">
+                              <a:lumMod val="50000"/>
+                            </a:schemeClr>
+                          </a:solidFill>
+                        </a:rPr>
+                        <a:t>buscado</a:t>
+                      </a:r>
+                      <a:r>
+                        <a:rPr lang="en-US" sz="1400" i="0" dirty="0">
+                          <a:solidFill>
+                            <a:schemeClr val="bg2">
+                              <a:lumMod val="50000"/>
+                            </a:schemeClr>
+                          </a:solidFill>
+                        </a:rPr>
+                        <a:t> hasta </a:t>
+                      </a:r>
+                      <a:r>
+                        <a:rPr lang="en-US" sz="1400" i="0" dirty="0" err="1">
+                          <a:solidFill>
+                            <a:schemeClr val="bg2">
+                              <a:lumMod val="50000"/>
+                            </a:schemeClr>
+                          </a:solidFill>
+                        </a:rPr>
+                        <a:t>ahora</a:t>
+                      </a:r>
+                      <a:r>
+                        <a:rPr lang="en-US" sz="1400" i="0" dirty="0">
+                          <a:solidFill>
+                            <a:schemeClr val="bg2">
+                              <a:lumMod val="50000"/>
+                            </a:schemeClr>
+                          </a:solidFill>
+                        </a:rPr>
+                        <a:t>?</a:t>
+                      </a:r>
+                    </a:p>
+                    <a:p>
+                      <a:pPr marL="285750" marR="0" lvl="0" indent="-285750" algn="l" defTabSz="914400" rtl="0" eaLnBrk="1" fontAlgn="auto" latinLnBrk="0" hangingPunct="1">
+                        <a:lnSpc>
+                          <a:spcPct val="100000"/>
+                        </a:lnSpc>
+                        <a:spcBef>
+                          <a:spcPts val="0"/>
+                        </a:spcBef>
+                        <a:spcAft>
+                          <a:spcPts val="0"/>
+                        </a:spcAft>
+                        <a:buClrTx/>
+                        <a:buSzTx/>
+                        <a:buFont typeface="Arial" panose="020B0604020202020204" pitchFamily="34" charset="0"/>
+                        <a:buChar char="•"/>
+                        <a:tabLst/>
+                        <a:defRPr/>
+                      </a:pPr>
+                      <a:r>
+                        <a:rPr lang="en-US" sz="1400" i="0" dirty="0">
+                          <a:solidFill>
+                            <a:schemeClr val="bg2">
+                              <a:lumMod val="50000"/>
+                            </a:schemeClr>
+                          </a:solidFill>
+                        </a:rPr>
+                        <a:t>¿</a:t>
+                      </a:r>
+                      <a:r>
+                        <a:rPr lang="en-US" sz="1400" i="0" dirty="0" err="1">
+                          <a:solidFill>
+                            <a:schemeClr val="bg2">
+                              <a:lumMod val="50000"/>
+                            </a:schemeClr>
+                          </a:solidFill>
+                        </a:rPr>
+                        <a:t>Puedo</a:t>
+                      </a:r>
+                      <a:r>
+                        <a:rPr lang="en-US" sz="1400" i="0" dirty="0">
+                          <a:solidFill>
+                            <a:schemeClr val="bg2">
+                              <a:lumMod val="50000"/>
+                            </a:schemeClr>
+                          </a:solidFill>
+                        </a:rPr>
+                        <a:t> </a:t>
+                      </a:r>
+                      <a:r>
+                        <a:rPr lang="en-US" sz="1400" i="0" dirty="0" err="1">
+                          <a:solidFill>
+                            <a:schemeClr val="bg2">
+                              <a:lumMod val="50000"/>
+                            </a:schemeClr>
+                          </a:solidFill>
+                        </a:rPr>
+                        <a:t>realizar</a:t>
+                      </a:r>
+                      <a:r>
+                        <a:rPr lang="en-US" sz="1400" i="0" dirty="0">
+                          <a:solidFill>
+                            <a:schemeClr val="bg2">
+                              <a:lumMod val="50000"/>
+                            </a:schemeClr>
+                          </a:solidFill>
+                        </a:rPr>
+                        <a:t> una </a:t>
+                      </a:r>
+                      <a:r>
+                        <a:rPr lang="en-US" sz="1400" i="0" dirty="0" err="1">
+                          <a:solidFill>
+                            <a:schemeClr val="bg2">
+                              <a:lumMod val="50000"/>
+                            </a:schemeClr>
+                          </a:solidFill>
+                        </a:rPr>
+                        <a:t>reserva</a:t>
+                      </a:r>
+                      <a:r>
+                        <a:rPr lang="en-US" sz="1400" i="0" dirty="0">
+                          <a:solidFill>
+                            <a:schemeClr val="bg2">
+                              <a:lumMod val="50000"/>
+                            </a:schemeClr>
+                          </a:solidFill>
+                        </a:rPr>
+                        <a:t> </a:t>
+                      </a:r>
+                      <a:r>
+                        <a:rPr lang="en-US" sz="1400" i="0" dirty="0" err="1">
+                          <a:solidFill>
+                            <a:schemeClr val="bg2">
+                              <a:lumMod val="50000"/>
+                            </a:schemeClr>
+                          </a:solidFill>
+                        </a:rPr>
+                        <a:t>desde</a:t>
+                      </a:r>
+                      <a:r>
+                        <a:rPr lang="en-US" sz="1400" i="0" dirty="0">
+                          <a:solidFill>
+                            <a:schemeClr val="bg2">
+                              <a:lumMod val="50000"/>
+                            </a:schemeClr>
+                          </a:solidFill>
+                        </a:rPr>
+                        <a:t> </a:t>
+                      </a:r>
+                      <a:r>
+                        <a:rPr lang="en-US" sz="1400" i="0" dirty="0" err="1">
+                          <a:solidFill>
+                            <a:schemeClr val="bg2">
+                              <a:lumMod val="50000"/>
+                            </a:schemeClr>
+                          </a:solidFill>
+                        </a:rPr>
+                        <a:t>esta</a:t>
+                      </a:r>
+                      <a:r>
+                        <a:rPr lang="en-US" sz="1400" i="0" dirty="0">
+                          <a:solidFill>
+                            <a:schemeClr val="bg2">
+                              <a:lumMod val="50000"/>
+                            </a:schemeClr>
+                          </a:solidFill>
+                        </a:rPr>
+                        <a:t> </a:t>
+                      </a:r>
+                      <a:r>
+                        <a:rPr lang="en-US" sz="1400" i="0" dirty="0" err="1">
+                          <a:solidFill>
+                            <a:schemeClr val="bg2">
+                              <a:lumMod val="50000"/>
+                            </a:schemeClr>
+                          </a:solidFill>
+                        </a:rPr>
+                        <a:t>página</a:t>
+                      </a:r>
+                      <a:r>
+                        <a:rPr lang="en-US" sz="1400" i="0" dirty="0">
+                          <a:solidFill>
+                            <a:schemeClr val="bg2">
+                              <a:lumMod val="50000"/>
+                            </a:schemeClr>
+                          </a:solidFill>
+                        </a:rPr>
+                        <a:t>?</a:t>
+                      </a:r>
+                    </a:p>
+                    <a:p>
+                      <a:pPr marL="285750" marR="0" lvl="0" indent="-285750" algn="l" defTabSz="914400" rtl="0" eaLnBrk="1" fontAlgn="auto" latinLnBrk="0" hangingPunct="1">
+                        <a:lnSpc>
+                          <a:spcPct val="100000"/>
+                        </a:lnSpc>
+                        <a:spcBef>
+                          <a:spcPts val="0"/>
+                        </a:spcBef>
+                        <a:spcAft>
+                          <a:spcPts val="0"/>
+                        </a:spcAft>
+                        <a:buClrTx/>
+                        <a:buSzTx/>
+                        <a:buFont typeface="Arial" panose="020B0604020202020204" pitchFamily="34" charset="0"/>
+                        <a:buChar char="•"/>
                         <a:tabLst/>
                         <a:defRPr/>
                       </a:pPr>
@@ -3988,15 +4949,775 @@
                         <a:defRPr/>
                       </a:pPr>
                       <a:r>
-                        <a:rPr lang="en-US" sz="1400" i="0" dirty="0">
-                          <a:solidFill>
-                            <a:schemeClr val="bg2">
-                              <a:lumMod val="50000"/>
-                            </a:schemeClr>
-                          </a:solidFill>
-                        </a:rPr>
-                        <a:t>List all ideas for improvement</a:t>
-                      </a:r>
+                        <a:rPr lang="en-US" sz="1400" i="0" dirty="0" err="1">
+                          <a:solidFill>
+                            <a:schemeClr val="bg2">
+                              <a:lumMod val="50000"/>
+                            </a:schemeClr>
+                          </a:solidFill>
+                        </a:rPr>
+                        <a:t>Implementar</a:t>
+                      </a:r>
+                      <a:r>
+                        <a:rPr lang="en-US" sz="1400" i="0" dirty="0">
+                          <a:solidFill>
+                            <a:schemeClr val="bg2">
+                              <a:lumMod val="50000"/>
+                            </a:schemeClr>
+                          </a:solidFill>
+                        </a:rPr>
+                        <a:t> un motor de </a:t>
+                      </a:r>
+                      <a:r>
+                        <a:rPr lang="en-US" sz="1400" i="0" dirty="0" err="1">
+                          <a:solidFill>
+                            <a:schemeClr val="bg2">
+                              <a:lumMod val="50000"/>
+                            </a:schemeClr>
+                          </a:solidFill>
+                        </a:rPr>
+                        <a:t>búsqueda</a:t>
+                      </a:r>
+                      <a:endParaRPr lang="en-US" sz="1400" i="0" dirty="0">
+                        <a:solidFill>
+                          <a:schemeClr val="bg2">
+                            <a:lumMod val="50000"/>
+                          </a:schemeClr>
+                        </a:solidFill>
+                      </a:endParaRPr>
+                    </a:p>
+                    <a:p>
+                      <a:pPr marL="285750" marR="0" lvl="0" indent="-285750" algn="l" defTabSz="914400" rtl="0" eaLnBrk="1" fontAlgn="auto" latinLnBrk="0" hangingPunct="1">
+                        <a:lnSpc>
+                          <a:spcPct val="100000"/>
+                        </a:lnSpc>
+                        <a:spcBef>
+                          <a:spcPts val="0"/>
+                        </a:spcBef>
+                        <a:spcAft>
+                          <a:spcPts val="0"/>
+                        </a:spcAft>
+                        <a:buClrTx/>
+                        <a:buSzTx/>
+                        <a:buFont typeface="Arial" panose="020B0604020202020204" pitchFamily="34" charset="0"/>
+                        <a:buChar char="•"/>
+                        <a:tabLst/>
+                        <a:defRPr/>
+                      </a:pPr>
+                      <a:r>
+                        <a:rPr lang="en-US" sz="1400" i="0" dirty="0" err="1">
+                          <a:solidFill>
+                            <a:schemeClr val="bg2">
+                              <a:lumMod val="50000"/>
+                            </a:schemeClr>
+                          </a:solidFill>
+                        </a:rPr>
+                        <a:t>Añadir</a:t>
+                      </a:r>
+                      <a:r>
+                        <a:rPr lang="en-US" sz="1400" i="0" dirty="0">
+                          <a:solidFill>
+                            <a:schemeClr val="bg2">
+                              <a:lumMod val="50000"/>
+                            </a:schemeClr>
+                          </a:solidFill>
+                        </a:rPr>
+                        <a:t> la </a:t>
+                      </a:r>
+                      <a:r>
+                        <a:rPr lang="en-US" sz="1400" i="0" dirty="0" err="1">
+                          <a:solidFill>
+                            <a:schemeClr val="bg2">
+                              <a:lumMod val="50000"/>
+                            </a:schemeClr>
+                          </a:solidFill>
+                        </a:rPr>
+                        <a:t>posibilidad</a:t>
+                      </a:r>
+                      <a:r>
+                        <a:rPr lang="en-US" sz="1400" i="0" dirty="0">
+                          <a:solidFill>
+                            <a:schemeClr val="bg2">
+                              <a:lumMod val="50000"/>
+                            </a:schemeClr>
+                          </a:solidFill>
+                        </a:rPr>
+                        <a:t> de </a:t>
+                      </a:r>
+                      <a:r>
+                        <a:rPr lang="en-US" sz="1400" i="0" dirty="0" err="1">
+                          <a:solidFill>
+                            <a:schemeClr val="bg2">
+                              <a:lumMod val="50000"/>
+                            </a:schemeClr>
+                          </a:solidFill>
+                        </a:rPr>
+                        <a:t>registro</a:t>
+                      </a:r>
+                      <a:endParaRPr lang="en-US" sz="1400" i="0" dirty="0">
+                        <a:solidFill>
+                          <a:schemeClr val="bg2">
+                            <a:lumMod val="50000"/>
+                          </a:schemeClr>
+                        </a:solidFill>
+                      </a:endParaRPr>
+                    </a:p>
+                    <a:p>
+                      <a:pPr marL="285750" marR="0" lvl="0" indent="-285750" algn="l" defTabSz="914400" rtl="0" eaLnBrk="1" fontAlgn="auto" latinLnBrk="0" hangingPunct="1">
+                        <a:lnSpc>
+                          <a:spcPct val="100000"/>
+                        </a:lnSpc>
+                        <a:spcBef>
+                          <a:spcPts val="0"/>
+                        </a:spcBef>
+                        <a:spcAft>
+                          <a:spcPts val="0"/>
+                        </a:spcAft>
+                        <a:buClrTx/>
+                        <a:buSzTx/>
+                        <a:buFont typeface="Arial" panose="020B0604020202020204" pitchFamily="34" charset="0"/>
+                        <a:buChar char="•"/>
+                        <a:tabLst/>
+                        <a:defRPr/>
+                      </a:pPr>
+                      <a:r>
+                        <a:rPr lang="en-US" sz="1400" i="0" dirty="0" err="1">
+                          <a:solidFill>
+                            <a:schemeClr val="bg2">
+                              <a:lumMod val="50000"/>
+                            </a:schemeClr>
+                          </a:solidFill>
+                        </a:rPr>
+                        <a:t>Aumentar</a:t>
+                      </a:r>
+                      <a:r>
+                        <a:rPr lang="en-US" sz="1400" i="0" dirty="0">
+                          <a:solidFill>
+                            <a:schemeClr val="bg2">
+                              <a:lumMod val="50000"/>
+                            </a:schemeClr>
+                          </a:solidFill>
+                        </a:rPr>
+                        <a:t> la </a:t>
+                      </a:r>
+                      <a:r>
+                        <a:rPr lang="en-US" sz="1400" i="0" dirty="0" err="1">
+                          <a:solidFill>
+                            <a:schemeClr val="bg2">
+                              <a:lumMod val="50000"/>
+                            </a:schemeClr>
+                          </a:solidFill>
+                        </a:rPr>
+                        <a:t>cantidad</a:t>
+                      </a:r>
+                      <a:r>
+                        <a:rPr lang="en-US" sz="1400" i="0" dirty="0">
+                          <a:solidFill>
+                            <a:schemeClr val="bg2">
+                              <a:lumMod val="50000"/>
+                            </a:schemeClr>
+                          </a:solidFill>
+                        </a:rPr>
+                        <a:t> de </a:t>
+                      </a:r>
+                      <a:r>
+                        <a:rPr lang="en-US" sz="1400" i="0" dirty="0" err="1">
+                          <a:solidFill>
+                            <a:schemeClr val="bg2">
+                              <a:lumMod val="50000"/>
+                            </a:schemeClr>
+                          </a:solidFill>
+                        </a:rPr>
+                        <a:t>idiomas</a:t>
+                      </a:r>
+                      <a:r>
+                        <a:rPr lang="en-US" sz="1400" i="0" dirty="0">
+                          <a:solidFill>
+                            <a:schemeClr val="bg2">
+                              <a:lumMod val="50000"/>
+                            </a:schemeClr>
+                          </a:solidFill>
+                        </a:rPr>
+                        <a:t> </a:t>
+                      </a:r>
+                      <a:r>
+                        <a:rPr lang="en-US" sz="1400" i="0" dirty="0" err="1">
+                          <a:solidFill>
+                            <a:schemeClr val="bg2">
+                              <a:lumMod val="50000"/>
+                            </a:schemeClr>
+                          </a:solidFill>
+                        </a:rPr>
+                        <a:t>en</a:t>
+                      </a:r>
+                      <a:r>
+                        <a:rPr lang="en-US" sz="1400" i="0" dirty="0">
+                          <a:solidFill>
+                            <a:schemeClr val="bg2">
+                              <a:lumMod val="50000"/>
+                            </a:schemeClr>
+                          </a:solidFill>
+                        </a:rPr>
+                        <a:t> la que se </a:t>
+                      </a:r>
+                      <a:r>
+                        <a:rPr lang="en-US" sz="1400" i="0" dirty="0" err="1">
+                          <a:solidFill>
+                            <a:schemeClr val="bg2">
+                              <a:lumMod val="50000"/>
+                            </a:schemeClr>
+                          </a:solidFill>
+                        </a:rPr>
+                        <a:t>encuentra</a:t>
+                      </a:r>
+                      <a:r>
+                        <a:rPr lang="en-US" sz="1400" i="0" dirty="0">
+                          <a:solidFill>
+                            <a:schemeClr val="bg2">
+                              <a:lumMod val="50000"/>
+                            </a:schemeClr>
+                          </a:solidFill>
+                        </a:rPr>
+                        <a:t> disponible la </a:t>
+                      </a:r>
+                      <a:r>
+                        <a:rPr lang="en-US" sz="1400" i="0" dirty="0" err="1">
+                          <a:solidFill>
+                            <a:schemeClr val="bg2">
+                              <a:lumMod val="50000"/>
+                            </a:schemeClr>
+                          </a:solidFill>
+                        </a:rPr>
+                        <a:t>información</a:t>
+                      </a:r>
+                      <a:endParaRPr lang="en-US" sz="1400" i="0" dirty="0">
+                        <a:solidFill>
+                          <a:schemeClr val="bg2">
+                            <a:lumMod val="50000"/>
+                          </a:schemeClr>
+                        </a:solidFill>
+                      </a:endParaRPr>
+                    </a:p>
+                    <a:p>
+                      <a:pPr marL="285750" marR="0" lvl="0" indent="-285750" algn="l" defTabSz="914400" rtl="0" eaLnBrk="1" fontAlgn="auto" latinLnBrk="0" hangingPunct="1">
+                        <a:lnSpc>
+                          <a:spcPct val="100000"/>
+                        </a:lnSpc>
+                        <a:spcBef>
+                          <a:spcPts val="0"/>
+                        </a:spcBef>
+                        <a:spcAft>
+                          <a:spcPts val="0"/>
+                        </a:spcAft>
+                        <a:buClrTx/>
+                        <a:buSzTx/>
+                        <a:buFont typeface="Arial" panose="020B0604020202020204" pitchFamily="34" charset="0"/>
+                        <a:buChar char="•"/>
+                        <a:tabLst/>
+                        <a:defRPr/>
+                      </a:pPr>
+                      <a:r>
+                        <a:rPr lang="en-US" sz="1400" i="0" dirty="0" err="1">
+                          <a:solidFill>
+                            <a:schemeClr val="bg2">
+                              <a:lumMod val="50000"/>
+                            </a:schemeClr>
+                          </a:solidFill>
+                        </a:rPr>
+                        <a:t>Implementar</a:t>
+                      </a:r>
+                      <a:r>
+                        <a:rPr lang="en-US" sz="1400" i="0" dirty="0">
+                          <a:solidFill>
+                            <a:schemeClr val="bg2">
+                              <a:lumMod val="50000"/>
+                            </a:schemeClr>
+                          </a:solidFill>
+                        </a:rPr>
+                        <a:t> una </a:t>
+                      </a:r>
+                      <a:r>
+                        <a:rPr lang="en-US" sz="1400" i="0" dirty="0" err="1">
+                          <a:solidFill>
+                            <a:schemeClr val="bg2">
+                              <a:lumMod val="50000"/>
+                            </a:schemeClr>
+                          </a:solidFill>
+                        </a:rPr>
+                        <a:t>interfaz</a:t>
+                      </a:r>
+                      <a:r>
+                        <a:rPr lang="en-US" sz="1400" i="0" dirty="0">
+                          <a:solidFill>
+                            <a:schemeClr val="bg2">
+                              <a:lumMod val="50000"/>
+                            </a:schemeClr>
+                          </a:solidFill>
+                        </a:rPr>
+                        <a:t> </a:t>
+                      </a:r>
+                      <a:r>
+                        <a:rPr lang="en-US" sz="1400" i="0" dirty="0" err="1">
+                          <a:solidFill>
+                            <a:schemeClr val="bg2">
+                              <a:lumMod val="50000"/>
+                            </a:schemeClr>
+                          </a:solidFill>
+                        </a:rPr>
+                        <a:t>oscura</a:t>
+                      </a:r>
+                      <a:r>
+                        <a:rPr lang="en-US" sz="1400" i="0" dirty="0">
+                          <a:solidFill>
+                            <a:schemeClr val="bg2">
+                              <a:lumMod val="50000"/>
+                            </a:schemeClr>
+                          </a:solidFill>
+                        </a:rPr>
+                        <a:t> </a:t>
+                      </a:r>
+                      <a:r>
+                        <a:rPr lang="en-US" sz="1400" i="0" dirty="0" err="1">
+                          <a:solidFill>
+                            <a:schemeClr val="bg2">
+                              <a:lumMod val="50000"/>
+                            </a:schemeClr>
+                          </a:solidFill>
+                        </a:rPr>
+                        <a:t>menos</a:t>
+                      </a:r>
+                      <a:r>
+                        <a:rPr lang="en-US" sz="1400" i="0" dirty="0">
+                          <a:solidFill>
+                            <a:schemeClr val="bg2">
+                              <a:lumMod val="50000"/>
+                            </a:schemeClr>
+                          </a:solidFill>
+                        </a:rPr>
+                        <a:t> </a:t>
+                      </a:r>
+                      <a:r>
+                        <a:rPr lang="en-US" sz="1400" i="0" dirty="0" err="1">
+                          <a:solidFill>
+                            <a:schemeClr val="bg2">
+                              <a:lumMod val="50000"/>
+                            </a:schemeClr>
+                          </a:solidFill>
+                        </a:rPr>
+                        <a:t>dañina</a:t>
+                      </a:r>
+                      <a:r>
+                        <a:rPr lang="en-US" sz="1400" i="0" dirty="0">
+                          <a:solidFill>
+                            <a:schemeClr val="bg2">
+                              <a:lumMod val="50000"/>
+                            </a:schemeClr>
+                          </a:solidFill>
+                        </a:rPr>
+                        <a:t> a la vista</a:t>
+                      </a:r>
+                    </a:p>
+                    <a:p>
+                      <a:pPr marL="285750" marR="0" lvl="0" indent="-285750" algn="l" defTabSz="914400" rtl="0" eaLnBrk="1" fontAlgn="auto" latinLnBrk="0" hangingPunct="1">
+                        <a:lnSpc>
+                          <a:spcPct val="100000"/>
+                        </a:lnSpc>
+                        <a:spcBef>
+                          <a:spcPts val="0"/>
+                        </a:spcBef>
+                        <a:spcAft>
+                          <a:spcPts val="0"/>
+                        </a:spcAft>
+                        <a:buClrTx/>
+                        <a:buSzTx/>
+                        <a:buFont typeface="Arial" panose="020B0604020202020204" pitchFamily="34" charset="0"/>
+                        <a:buChar char="•"/>
+                        <a:tabLst/>
+                        <a:defRPr/>
+                      </a:pPr>
+                      <a:r>
+                        <a:rPr lang="en-US" sz="1400" i="0" dirty="0" err="1">
+                          <a:solidFill>
+                            <a:schemeClr val="bg2">
+                              <a:lumMod val="50000"/>
+                            </a:schemeClr>
+                          </a:solidFill>
+                        </a:rPr>
+                        <a:t>Mejorar</a:t>
+                      </a:r>
+                      <a:r>
+                        <a:rPr lang="en-US" sz="1400" i="0" dirty="0">
+                          <a:solidFill>
+                            <a:schemeClr val="bg2">
+                              <a:lumMod val="50000"/>
+                            </a:schemeClr>
+                          </a:solidFill>
+                        </a:rPr>
+                        <a:t> el </a:t>
+                      </a:r>
+                      <a:r>
+                        <a:rPr lang="en-US" sz="1400" i="0" dirty="0" err="1">
+                          <a:solidFill>
+                            <a:schemeClr val="bg2">
+                              <a:lumMod val="50000"/>
+                            </a:schemeClr>
+                          </a:solidFill>
+                        </a:rPr>
+                        <a:t>servicio</a:t>
+                      </a:r>
+                      <a:r>
+                        <a:rPr lang="en-US" sz="1400" i="0" dirty="0">
+                          <a:solidFill>
+                            <a:schemeClr val="bg2">
+                              <a:lumMod val="50000"/>
+                            </a:schemeClr>
+                          </a:solidFill>
+                        </a:rPr>
+                        <a:t> de </a:t>
+                      </a:r>
+                      <a:r>
+                        <a:rPr lang="en-US" sz="1400" i="0" dirty="0" err="1">
+                          <a:solidFill>
+                            <a:schemeClr val="bg2">
+                              <a:lumMod val="50000"/>
+                            </a:schemeClr>
+                          </a:solidFill>
+                        </a:rPr>
+                        <a:t>asistencia</a:t>
+                      </a:r>
+                      <a:r>
+                        <a:rPr lang="en-US" sz="1400" i="0" dirty="0">
+                          <a:solidFill>
+                            <a:schemeClr val="bg2">
+                              <a:lumMod val="50000"/>
+                            </a:schemeClr>
+                          </a:solidFill>
+                        </a:rPr>
+                        <a:t> (Bot de </a:t>
+                      </a:r>
+                      <a:r>
+                        <a:rPr lang="en-US" sz="1400" i="0" dirty="0" err="1">
+                          <a:solidFill>
+                            <a:schemeClr val="bg2">
+                              <a:lumMod val="50000"/>
+                            </a:schemeClr>
+                          </a:solidFill>
+                        </a:rPr>
+                        <a:t>ayuda</a:t>
+                      </a:r>
+                      <a:r>
+                        <a:rPr lang="en-US" sz="1400" i="0" dirty="0">
+                          <a:solidFill>
+                            <a:schemeClr val="bg2">
+                              <a:lumMod val="50000"/>
+                            </a:schemeClr>
+                          </a:solidFill>
+                        </a:rPr>
+                        <a:t>)</a:t>
+                      </a:r>
+                    </a:p>
+                    <a:p>
+                      <a:pPr marL="285750" marR="0" lvl="0" indent="-285750" algn="l" defTabSz="914400" rtl="0" eaLnBrk="1" fontAlgn="auto" latinLnBrk="0" hangingPunct="1">
+                        <a:lnSpc>
+                          <a:spcPct val="100000"/>
+                        </a:lnSpc>
+                        <a:spcBef>
+                          <a:spcPts val="0"/>
+                        </a:spcBef>
+                        <a:spcAft>
+                          <a:spcPts val="0"/>
+                        </a:spcAft>
+                        <a:buClrTx/>
+                        <a:buSzTx/>
+                        <a:buFont typeface="Arial" panose="020B0604020202020204" pitchFamily="34" charset="0"/>
+                        <a:buChar char="•"/>
+                        <a:tabLst/>
+                        <a:defRPr/>
+                      </a:pPr>
+                      <a:r>
+                        <a:rPr lang="en-US" sz="1400" i="0" dirty="0" err="1">
+                          <a:solidFill>
+                            <a:schemeClr val="bg2">
+                              <a:lumMod val="50000"/>
+                            </a:schemeClr>
+                          </a:solidFill>
+                        </a:rPr>
+                        <a:t>Actualizar</a:t>
+                      </a:r>
+                      <a:r>
+                        <a:rPr lang="en-US" sz="1400" i="0" dirty="0">
+                          <a:solidFill>
+                            <a:schemeClr val="bg2">
+                              <a:lumMod val="50000"/>
+                            </a:schemeClr>
+                          </a:solidFill>
+                        </a:rPr>
+                        <a:t> la </a:t>
+                      </a:r>
+                      <a:r>
+                        <a:rPr lang="en-US" sz="1400" i="0" dirty="0" err="1">
+                          <a:solidFill>
+                            <a:schemeClr val="bg2">
+                              <a:lumMod val="50000"/>
+                            </a:schemeClr>
+                          </a:solidFill>
+                        </a:rPr>
+                        <a:t>información</a:t>
+                      </a:r>
+                      <a:r>
+                        <a:rPr lang="en-US" sz="1400" i="0" dirty="0">
+                          <a:solidFill>
+                            <a:schemeClr val="bg2">
+                              <a:lumMod val="50000"/>
+                            </a:schemeClr>
+                          </a:solidFill>
+                        </a:rPr>
+                        <a:t> para la </a:t>
+                      </a:r>
+                      <a:r>
+                        <a:rPr lang="en-US" sz="1400" i="0" dirty="0" err="1">
+                          <a:solidFill>
+                            <a:schemeClr val="bg2">
+                              <a:lumMod val="50000"/>
+                            </a:schemeClr>
+                          </a:solidFill>
+                        </a:rPr>
+                        <a:t>comunidad</a:t>
+                      </a:r>
+                      <a:r>
+                        <a:rPr lang="en-US" sz="1400" i="0" dirty="0">
+                          <a:solidFill>
+                            <a:schemeClr val="bg2">
+                              <a:lumMod val="50000"/>
+                            </a:schemeClr>
+                          </a:solidFill>
+                        </a:rPr>
+                        <a:t> </a:t>
+                      </a:r>
+                      <a:r>
+                        <a:rPr lang="en-US" sz="1400" i="0" dirty="0" err="1">
+                          <a:solidFill>
+                            <a:schemeClr val="bg2">
+                              <a:lumMod val="50000"/>
+                            </a:schemeClr>
+                          </a:solidFill>
+                        </a:rPr>
+                        <a:t>minusválida</a:t>
+                      </a:r>
+                      <a:endParaRPr lang="en-US" sz="1400" i="0" dirty="0">
+                        <a:solidFill>
+                          <a:schemeClr val="bg2">
+                            <a:lumMod val="50000"/>
+                          </a:schemeClr>
+                        </a:solidFill>
+                      </a:endParaRPr>
+                    </a:p>
+                    <a:p>
+                      <a:pPr marL="285750" marR="0" lvl="0" indent="-285750" algn="l" defTabSz="914400" rtl="0" eaLnBrk="1" fontAlgn="auto" latinLnBrk="0" hangingPunct="1">
+                        <a:lnSpc>
+                          <a:spcPct val="100000"/>
+                        </a:lnSpc>
+                        <a:spcBef>
+                          <a:spcPts val="0"/>
+                        </a:spcBef>
+                        <a:spcAft>
+                          <a:spcPts val="0"/>
+                        </a:spcAft>
+                        <a:buClrTx/>
+                        <a:buSzTx/>
+                        <a:buFont typeface="Arial" panose="020B0604020202020204" pitchFamily="34" charset="0"/>
+                        <a:buChar char="•"/>
+                        <a:tabLst/>
+                        <a:defRPr/>
+                      </a:pPr>
+                      <a:r>
+                        <a:rPr lang="en-US" sz="1400" i="0" dirty="0" err="1">
+                          <a:solidFill>
+                            <a:schemeClr val="bg2">
+                              <a:lumMod val="50000"/>
+                            </a:schemeClr>
+                          </a:solidFill>
+                        </a:rPr>
+                        <a:t>Aumentar</a:t>
+                      </a:r>
+                      <a:r>
+                        <a:rPr lang="en-US" sz="1400" i="0" dirty="0">
+                          <a:solidFill>
+                            <a:schemeClr val="bg2">
+                              <a:lumMod val="50000"/>
+                            </a:schemeClr>
+                          </a:solidFill>
+                        </a:rPr>
+                        <a:t> </a:t>
+                      </a:r>
+                      <a:r>
+                        <a:rPr lang="en-US" sz="1400" i="0" dirty="0" err="1">
+                          <a:solidFill>
+                            <a:schemeClr val="bg2">
+                              <a:lumMod val="50000"/>
+                            </a:schemeClr>
+                          </a:solidFill>
+                        </a:rPr>
+                        <a:t>disponibilidad</a:t>
+                      </a:r>
+                      <a:r>
+                        <a:rPr lang="en-US" sz="1400" i="0" dirty="0">
+                          <a:solidFill>
+                            <a:schemeClr val="bg2">
+                              <a:lumMod val="50000"/>
+                            </a:schemeClr>
+                          </a:solidFill>
+                        </a:rPr>
+                        <a:t> para </a:t>
+                      </a:r>
+                      <a:r>
+                        <a:rPr lang="en-US" sz="1400" i="0" dirty="0" err="1">
+                          <a:solidFill>
+                            <a:schemeClr val="bg2">
+                              <a:lumMod val="50000"/>
+                            </a:schemeClr>
+                          </a:solidFill>
+                        </a:rPr>
+                        <a:t>otros</a:t>
+                      </a:r>
+                      <a:r>
+                        <a:rPr lang="en-US" sz="1400" i="0" dirty="0">
+                          <a:solidFill>
+                            <a:schemeClr val="bg2">
+                              <a:lumMod val="50000"/>
+                            </a:schemeClr>
+                          </a:solidFill>
+                        </a:rPr>
+                        <a:t> </a:t>
+                      </a:r>
+                      <a:r>
+                        <a:rPr lang="en-US" sz="1400" i="0" dirty="0" err="1">
+                          <a:solidFill>
+                            <a:schemeClr val="bg2">
+                              <a:lumMod val="50000"/>
+                            </a:schemeClr>
+                          </a:solidFill>
+                        </a:rPr>
+                        <a:t>dispositivos</a:t>
+                      </a:r>
+                      <a:r>
+                        <a:rPr lang="en-US" sz="1400" i="0" dirty="0">
+                          <a:solidFill>
+                            <a:schemeClr val="bg2">
+                              <a:lumMod val="50000"/>
+                            </a:schemeClr>
+                          </a:solidFill>
+                        </a:rPr>
+                        <a:t> y </a:t>
+                      </a:r>
+                      <a:r>
+                        <a:rPr lang="en-US" sz="1400" i="0" dirty="0" err="1">
+                          <a:solidFill>
+                            <a:schemeClr val="bg2">
+                              <a:lumMod val="50000"/>
+                            </a:schemeClr>
+                          </a:solidFill>
+                        </a:rPr>
+                        <a:t>plataformas</a:t>
+                      </a:r>
+                      <a:endParaRPr lang="en-US" sz="1400" i="0" dirty="0">
+                        <a:solidFill>
+                          <a:schemeClr val="bg2">
+                            <a:lumMod val="50000"/>
+                          </a:schemeClr>
+                        </a:solidFill>
+                      </a:endParaRPr>
+                    </a:p>
+                    <a:p>
+                      <a:pPr marL="285750" marR="0" lvl="0" indent="-285750" algn="l" defTabSz="914400" rtl="0" eaLnBrk="1" fontAlgn="auto" latinLnBrk="0" hangingPunct="1">
+                        <a:lnSpc>
+                          <a:spcPct val="100000"/>
+                        </a:lnSpc>
+                        <a:spcBef>
+                          <a:spcPts val="0"/>
+                        </a:spcBef>
+                        <a:spcAft>
+                          <a:spcPts val="0"/>
+                        </a:spcAft>
+                        <a:buClrTx/>
+                        <a:buSzTx/>
+                        <a:buFont typeface="Arial" panose="020B0604020202020204" pitchFamily="34" charset="0"/>
+                        <a:buChar char="•"/>
+                        <a:tabLst/>
+                        <a:defRPr/>
+                      </a:pPr>
+                      <a:endParaRPr lang="en-US" sz="1400" i="0" dirty="0">
+                        <a:solidFill>
+                          <a:schemeClr val="bg2">
+                            <a:lumMod val="50000"/>
+                          </a:schemeClr>
+                        </a:solidFill>
+                      </a:endParaRPr>
+                    </a:p>
+                    <a:p>
+                      <a:pPr marL="285750" marR="0" lvl="0" indent="-285750" algn="l" defTabSz="914400" rtl="0" eaLnBrk="1" fontAlgn="auto" latinLnBrk="0" hangingPunct="1">
+                        <a:lnSpc>
+                          <a:spcPct val="100000"/>
+                        </a:lnSpc>
+                        <a:spcBef>
+                          <a:spcPts val="0"/>
+                        </a:spcBef>
+                        <a:spcAft>
+                          <a:spcPts val="0"/>
+                        </a:spcAft>
+                        <a:buClrTx/>
+                        <a:buSzTx/>
+                        <a:buFont typeface="Arial" panose="020B0604020202020204" pitchFamily="34" charset="0"/>
+                        <a:buChar char="•"/>
+                        <a:tabLst/>
+                        <a:defRPr/>
+                      </a:pPr>
+                      <a:endParaRPr lang="en-US" sz="1400" i="0" dirty="0">
+                        <a:solidFill>
+                          <a:schemeClr val="bg2">
+                            <a:lumMod val="50000"/>
+                          </a:schemeClr>
+                        </a:solidFill>
+                      </a:endParaRPr>
+                    </a:p>
+                    <a:p>
+                      <a:pPr marL="0" marR="0" lvl="0" indent="0" algn="l" defTabSz="914400" rtl="0" eaLnBrk="1" fontAlgn="auto" latinLnBrk="0" hangingPunct="1">
+                        <a:lnSpc>
+                          <a:spcPct val="100000"/>
+                        </a:lnSpc>
+                        <a:spcBef>
+                          <a:spcPts val="0"/>
+                        </a:spcBef>
+                        <a:spcAft>
+                          <a:spcPts val="0"/>
+                        </a:spcAft>
+                        <a:buClrTx/>
+                        <a:buSzTx/>
+                        <a:buFont typeface="Arial" panose="020B0604020202020204" pitchFamily="34" charset="0"/>
+                        <a:buNone/>
+                        <a:tabLst/>
+                        <a:defRPr/>
+                      </a:pPr>
+                      <a:endParaRPr lang="en-US" sz="1400" i="0" dirty="0"/>
+                    </a:p>
+                    <a:p>
+                      <a:pPr marL="0" marR="0" lvl="0" indent="0" algn="l" defTabSz="914400" rtl="0" eaLnBrk="1" fontAlgn="auto" latinLnBrk="0" hangingPunct="1">
+                        <a:lnSpc>
+                          <a:spcPct val="100000"/>
+                        </a:lnSpc>
+                        <a:spcBef>
+                          <a:spcPts val="0"/>
+                        </a:spcBef>
+                        <a:spcAft>
+                          <a:spcPts val="0"/>
+                        </a:spcAft>
+                        <a:buClrTx/>
+                        <a:buSzTx/>
+                        <a:buFont typeface="Arial" panose="020B0604020202020204" pitchFamily="34" charset="0"/>
+                        <a:buNone/>
+                        <a:tabLst/>
+                        <a:defRPr/>
+                      </a:pPr>
                       <a:endParaRPr lang="en-US" sz="1400" i="0" dirty="0"/>
                     </a:p>
                   </a:txBody>
@@ -4020,285 +5741,6 @@
     <p:extLst>
       <p:ext uri="{BB962C8B-B14F-4D97-AF65-F5344CB8AC3E}">
         <p14:creationId xmlns:p14="http://schemas.microsoft.com/office/powerpoint/2010/main" val="1967436657"/>
-      </p:ext>
-    </p:extLst>
-  </p:cSld>
-  <p:clrMapOvr>
-    <a:masterClrMapping/>
-  </p:clrMapOvr>
-</p:sld>
-</file>
-
-<file path=ppt/slides/slide3.xml><?xml version="1.0" encoding="utf-8"?>
-<p:sld xmlns:a="http://schemas.openxmlformats.org/drawingml/2006/main" xmlns:r="http://schemas.openxmlformats.org/officeDocument/2006/relationships" xmlns:p="http://schemas.openxmlformats.org/presentationml/2006/main">
-  <p:cSld>
-    <p:spTree>
-      <p:nvGrpSpPr>
-        <p:cNvPr id="1" name=""/>
-        <p:cNvGrpSpPr/>
-        <p:nvPr/>
-      </p:nvGrpSpPr>
-      <p:grpSpPr>
-        <a:xfrm>
-          <a:off x="0" y="0"/>
-          <a:ext cx="0" cy="0"/>
-          <a:chOff x="0" y="0"/>
-          <a:chExt cx="0" cy="0"/>
-        </a:xfrm>
-      </p:grpSpPr>
-      <p:sp>
-        <p:nvSpPr>
-          <p:cNvPr id="5" name="TextBox 4">
-            <a:extLst>
-              <a:ext uri="{FF2B5EF4-FFF2-40B4-BE49-F238E27FC236}">
-                <a16:creationId xmlns:a16="http://schemas.microsoft.com/office/drawing/2014/main" id="{E1829E29-EF69-4153-95EC-9C1110DC19B6}"/>
-              </a:ext>
-            </a:extLst>
-          </p:cNvPr>
-          <p:cNvSpPr txBox="1"/>
-          <p:nvPr/>
-        </p:nvSpPr>
-        <p:spPr>
-          <a:xfrm>
-            <a:off x="13335" y="6582975"/>
-            <a:ext cx="12192000" cy="276999"/>
-          </a:xfrm>
-          <a:prstGeom prst="rect">
-            <a:avLst/>
-          </a:prstGeom>
-          <a:solidFill>
-            <a:schemeClr val="accent4">
-              <a:lumMod val="20000"/>
-              <a:lumOff val="80000"/>
-            </a:schemeClr>
-          </a:solidFill>
-        </p:spPr>
-        <p:txBody>
-          <a:bodyPr wrap="square" rtlCol="0">
-            <a:spAutoFit/>
-          </a:bodyPr>
-          <a:lstStyle/>
-          <a:p>
-            <a:pPr lvl="0" algn="ctr"/>
-            <a:r>
-              <a:rPr lang="en-US" sz="1200" kern="1200" dirty="0">
-                <a:solidFill>
-                  <a:schemeClr val="tx1"/>
-                </a:solidFill>
-                <a:effectLst/>
-                <a:latin typeface="Roboto" panose="02000000000000000000" pitchFamily="2" charset="0"/>
-                <a:ea typeface="Roboto" panose="02000000000000000000" pitchFamily="2" charset="0"/>
-              </a:rPr>
-              <a:t>Want more tools and templates? </a:t>
-            </a:r>
-            <a:r>
-              <a:rPr lang="en-US" sz="1200" dirty="0">
-                <a:latin typeface="Roboto" panose="02000000000000000000" pitchFamily="2" charset="0"/>
-                <a:ea typeface="Roboto" panose="02000000000000000000" pitchFamily="2" charset="0"/>
-              </a:rPr>
-              <a:t>Visit </a:t>
-            </a:r>
-            <a:r>
-              <a:rPr lang="en-US" sz="1200" dirty="0">
-                <a:latin typeface="Roboto" panose="02000000000000000000" pitchFamily="2" charset="0"/>
-                <a:ea typeface="Roboto" panose="02000000000000000000" pitchFamily="2" charset="0"/>
-                <a:hlinkClick r:id="rId2"/>
-              </a:rPr>
-              <a:t>https://upboard.io/</a:t>
-            </a:r>
-            <a:r>
-              <a:rPr lang="en-US" sz="1200" dirty="0">
-                <a:latin typeface="Roboto" panose="02000000000000000000" pitchFamily="2" charset="0"/>
-                <a:ea typeface="Roboto" panose="02000000000000000000" pitchFamily="2" charset="0"/>
-              </a:rPr>
-              <a:t> </a:t>
-            </a:r>
-            <a:endParaRPr lang="en-US" sz="1200" kern="1200" dirty="0">
-              <a:solidFill>
-                <a:schemeClr val="tx1"/>
-              </a:solidFill>
-              <a:effectLst/>
-              <a:latin typeface="Roboto" panose="02000000000000000000" pitchFamily="2" charset="0"/>
-              <a:ea typeface="Roboto" panose="02000000000000000000" pitchFamily="2" charset="0"/>
-            </a:endParaRPr>
-          </a:p>
-        </p:txBody>
-      </p:sp>
-      <p:pic>
-        <p:nvPicPr>
-          <p:cNvPr id="1026" name="Picture 2" descr="upBOARD SaaS Team Collaboration Software Tools &amp; Templates">
-            <a:extLst>
-              <a:ext uri="{FF2B5EF4-FFF2-40B4-BE49-F238E27FC236}">
-                <a16:creationId xmlns:a16="http://schemas.microsoft.com/office/drawing/2014/main" id="{6A3E095C-17D7-4600-BCD0-79CA19B40E54}"/>
-              </a:ext>
-            </a:extLst>
-          </p:cNvPr>
-          <p:cNvPicPr>
-            <a:picLocks noChangeAspect="1" noChangeArrowheads="1"/>
-          </p:cNvPicPr>
-          <p:nvPr/>
-        </p:nvPicPr>
-        <p:blipFill>
-          <a:blip r:embed="rId3">
-            <a:extLst>
-              <a:ext uri="{28A0092B-C50C-407E-A947-70E740481C1C}">
-                <a14:useLocalDpi xmlns:a14="http://schemas.microsoft.com/office/drawing/2010/main" val="0"/>
-              </a:ext>
-            </a:extLst>
-          </a:blip>
-          <a:srcRect/>
-          <a:stretch>
-            <a:fillRect/>
-          </a:stretch>
-        </p:blipFill>
-        <p:spPr bwMode="auto">
-          <a:xfrm>
-            <a:off x="501576" y="3601335"/>
-            <a:ext cx="11009134" cy="2981640"/>
-          </a:xfrm>
-          <a:prstGeom prst="rect">
-            <a:avLst/>
-          </a:prstGeom>
-          <a:noFill/>
-          <a:extLst>
-            <a:ext uri="{909E8E84-426E-40DD-AFC4-6F175D3DCCD1}">
-              <a14:hiddenFill xmlns:a14="http://schemas.microsoft.com/office/drawing/2010/main">
-                <a:solidFill>
-                  <a:srgbClr val="FFFFFF"/>
-                </a:solidFill>
-              </a14:hiddenFill>
-            </a:ext>
-          </a:extLst>
-        </p:spPr>
-      </p:pic>
-      <p:sp>
-        <p:nvSpPr>
-          <p:cNvPr id="3" name="Content Placeholder 2">
-            <a:extLst>
-              <a:ext uri="{FF2B5EF4-FFF2-40B4-BE49-F238E27FC236}">
-                <a16:creationId xmlns:a16="http://schemas.microsoft.com/office/drawing/2014/main" id="{5AC0FA28-B511-4565-8C8A-44DEE740CC90}"/>
-              </a:ext>
-            </a:extLst>
-          </p:cNvPr>
-          <p:cNvSpPr>
-            <a:spLocks noGrp="1"/>
-          </p:cNvSpPr>
-          <p:nvPr>
-            <p:ph idx="1"/>
-          </p:nvPr>
-        </p:nvSpPr>
-        <p:spPr>
-          <a:xfrm>
-            <a:off x="827837" y="1011112"/>
-            <a:ext cx="10536326" cy="4081043"/>
-          </a:xfrm>
-        </p:spPr>
-        <p:txBody>
-          <a:bodyPr>
-            <a:noAutofit/>
-          </a:bodyPr>
-          <a:lstStyle/>
-          <a:p>
-            <a:pPr marL="0" indent="0" algn="ctr">
-              <a:buNone/>
-            </a:pPr>
-            <a:r>
-              <a:rPr lang="en-US" sz="3200" dirty="0">
-                <a:solidFill>
-                  <a:schemeClr val="accent1"/>
-                </a:solidFill>
-                <a:latin typeface="Calibri" panose="020F0502020204030204" pitchFamily="34" charset="0"/>
-                <a:cs typeface="Calibri" panose="020F0502020204030204" pitchFamily="34" charset="0"/>
-                <a:hlinkClick r:id="rId4"/>
-              </a:rPr>
-              <a:t>Join the upBOARD Community</a:t>
-            </a:r>
-            <a:r>
-              <a:rPr lang="en-US" sz="3200" dirty="0">
-                <a:solidFill>
-                  <a:schemeClr val="accent1"/>
-                </a:solidFill>
-                <a:latin typeface="Calibri" panose="020F0502020204030204" pitchFamily="34" charset="0"/>
-                <a:cs typeface="Calibri" panose="020F0502020204030204" pitchFamily="34" charset="0"/>
-              </a:rPr>
-              <a:t> to instantly find, customize or create your own business processes including:</a:t>
-            </a:r>
-          </a:p>
-          <a:p>
-            <a:pPr algn="ctr"/>
-            <a:endParaRPr lang="en-US" sz="500" b="1" dirty="0">
-              <a:solidFill>
-                <a:srgbClr val="FFC000"/>
-              </a:solidFill>
-              <a:latin typeface="Calibri" panose="020F0502020204030204" pitchFamily="34" charset="0"/>
-              <a:cs typeface="Calibri" panose="020F0502020204030204" pitchFamily="34" charset="0"/>
-            </a:endParaRPr>
-          </a:p>
-          <a:p>
-            <a:pPr algn="ctr"/>
-            <a:r>
-              <a:rPr lang="en-US" sz="2000" b="1" dirty="0">
-                <a:solidFill>
-                  <a:schemeClr val="accent1"/>
-                </a:solidFill>
-                <a:latin typeface="Calibri" panose="020F0502020204030204" pitchFamily="34" charset="0"/>
-                <a:cs typeface="Calibri" panose="020F0502020204030204" pitchFamily="34" charset="0"/>
-              </a:rPr>
-              <a:t>Interactive online templates</a:t>
-            </a:r>
-          </a:p>
-          <a:p>
-            <a:pPr algn="ctr"/>
-            <a:r>
-              <a:rPr lang="en-US" sz="2000" b="1" dirty="0">
-                <a:solidFill>
-                  <a:schemeClr val="accent1"/>
-                </a:solidFill>
-                <a:latin typeface="Calibri" panose="020F0502020204030204" pitchFamily="34" charset="0"/>
-                <a:cs typeface="Calibri" panose="020F0502020204030204" pitchFamily="34" charset="0"/>
-              </a:rPr>
-              <a:t>Full business processes</a:t>
-            </a:r>
-          </a:p>
-          <a:p>
-            <a:pPr algn="ctr"/>
-            <a:r>
-              <a:rPr lang="en-US" sz="2000" b="1" dirty="0">
-                <a:solidFill>
-                  <a:schemeClr val="accent1"/>
-                </a:solidFill>
-                <a:latin typeface="Calibri" panose="020F0502020204030204" pitchFamily="34" charset="0"/>
-                <a:cs typeface="Calibri" panose="020F0502020204030204" pitchFamily="34" charset="0"/>
-              </a:rPr>
-              <a:t>Dashboards &amp; analytics</a:t>
-            </a:r>
-          </a:p>
-          <a:p>
-            <a:pPr algn="ctr"/>
-            <a:r>
-              <a:rPr lang="en-US" sz="2000" b="1" dirty="0">
-                <a:solidFill>
-                  <a:schemeClr val="accent1"/>
-                </a:solidFill>
-                <a:latin typeface="Calibri" panose="020F0502020204030204" pitchFamily="34" charset="0"/>
-                <a:cs typeface="Calibri" panose="020F0502020204030204" pitchFamily="34" charset="0"/>
-              </a:rPr>
-              <a:t>Team collaboration tools</a:t>
-            </a:r>
-            <a:endParaRPr lang="en-US" sz="1400" dirty="0">
-              <a:solidFill>
-                <a:schemeClr val="accent1"/>
-              </a:solidFill>
-              <a:latin typeface="Calibri" panose="020F0502020204030204" pitchFamily="34" charset="0"/>
-              <a:cs typeface="Calibri" panose="020F0502020204030204" pitchFamily="34" charset="0"/>
-            </a:endParaRPr>
-          </a:p>
-        </p:txBody>
-      </p:sp>
-    </p:spTree>
-    <p:extLst>
-      <p:ext uri="{BB962C8B-B14F-4D97-AF65-F5344CB8AC3E}">
-        <p14:creationId xmlns:p14="http://schemas.microsoft.com/office/powerpoint/2010/main" val="2784704157"/>
       </p:ext>
     </p:extLst>
   </p:cSld>
@@ -4604,12 +6046,9 @@
 </file>
 
 <file path=customXml/item1.xml><?xml version="1.0" encoding="utf-8"?>
-<?mso-contentType ?>
-<FormTemplates xmlns="http://schemas.microsoft.com/sharepoint/v3/contenttype/forms">
-  <Display>DocumentLibraryForm</Display>
-  <Edit>DocumentLibraryForm</Edit>
-  <New>DocumentLibraryForm</New>
-</FormTemplates>
+<p:properties xmlns:p="http://schemas.microsoft.com/office/2006/metadata/properties" xmlns:xsi="http://www.w3.org/2001/XMLSchema-instance" xmlns:pc="http://schemas.microsoft.com/office/infopath/2007/PartnerControls">
+  <documentManagement/>
+</p:properties>
 </file>
 
 <file path=customXml/item2.xml><?xml version="1.0" encoding="utf-8"?>
@@ -4810,15 +6249,27 @@
 </file>
 
 <file path=customXml/item3.xml><?xml version="1.0" encoding="utf-8"?>
-<p:properties xmlns:p="http://schemas.microsoft.com/office/2006/metadata/properties" xmlns:xsi="http://www.w3.org/2001/XMLSchema-instance" xmlns:pc="http://schemas.microsoft.com/office/infopath/2007/PartnerControls">
-  <documentManagement/>
-</p:properties>
+<?mso-contentType ?>
+<FormTemplates xmlns="http://schemas.microsoft.com/sharepoint/v3/contenttype/forms">
+  <Display>DocumentLibraryForm</Display>
+  <Edit>DocumentLibraryForm</Edit>
+  <New>DocumentLibraryForm</New>
+</FormTemplates>
 </file>
 
 <file path=customXml/itemProps1.xml><?xml version="1.0" encoding="utf-8"?>
-<ds:datastoreItem xmlns:ds="http://schemas.openxmlformats.org/officeDocument/2006/customXml" ds:itemID="{1A6BB515-2F14-43B0-8DC0-FB6315D4BDBC}">
+<ds:datastoreItem xmlns:ds="http://schemas.openxmlformats.org/officeDocument/2006/customXml" ds:itemID="{1FD2720B-28F1-4100-8F03-3AFF0D1F5C1E}">
   <ds:schemaRefs>
-    <ds:schemaRef ds:uri="http://schemas.microsoft.com/sharepoint/v3/contenttype/forms"/>
+    <ds:schemaRef ds:uri="http://purl.org/dc/terms/"/>
+    <ds:schemaRef ds:uri="http://schemas.microsoft.com/office/infopath/2007/PartnerControls"/>
+    <ds:schemaRef ds:uri="http://schemas.microsoft.com/office/2006/metadata/properties"/>
+    <ds:schemaRef ds:uri="http://purl.org/dc/dcmitype/"/>
+    <ds:schemaRef ds:uri="http://schemas.microsoft.com/office/2006/documentManagement/types"/>
+    <ds:schemaRef ds:uri="http://purl.org/dc/elements/1.1/"/>
+    <ds:schemaRef ds:uri="http://www.w3.org/XML/1998/namespace"/>
+    <ds:schemaRef ds:uri="http://schemas.openxmlformats.org/package/2006/metadata/core-properties"/>
+    <ds:schemaRef ds:uri="2b6f4d9c-e67e-4634-a886-8566b3a998fa"/>
+    <ds:schemaRef ds:uri="3c7d788f-59f0-4ee8-87d4-6b60b595ee8d"/>
   </ds:schemaRefs>
 </ds:datastoreItem>
 </file>
@@ -4843,18 +6294,9 @@
 </file>
 
 <file path=customXml/itemProps3.xml><?xml version="1.0" encoding="utf-8"?>
-<ds:datastoreItem xmlns:ds="http://schemas.openxmlformats.org/officeDocument/2006/customXml" ds:itemID="{1FD2720B-28F1-4100-8F03-3AFF0D1F5C1E}">
+<ds:datastoreItem xmlns:ds="http://schemas.openxmlformats.org/officeDocument/2006/customXml" ds:itemID="{1A6BB515-2F14-43B0-8DC0-FB6315D4BDBC}">
   <ds:schemaRefs>
-    <ds:schemaRef ds:uri="http://purl.org/dc/terms/"/>
-    <ds:schemaRef ds:uri="http://schemas.microsoft.com/office/infopath/2007/PartnerControls"/>
-    <ds:schemaRef ds:uri="http://schemas.microsoft.com/office/2006/metadata/properties"/>
-    <ds:schemaRef ds:uri="http://purl.org/dc/dcmitype/"/>
-    <ds:schemaRef ds:uri="http://schemas.microsoft.com/office/2006/documentManagement/types"/>
-    <ds:schemaRef ds:uri="http://purl.org/dc/elements/1.1/"/>
-    <ds:schemaRef ds:uri="http://www.w3.org/XML/1998/namespace"/>
-    <ds:schemaRef ds:uri="http://schemas.openxmlformats.org/package/2006/metadata/core-properties"/>
-    <ds:schemaRef ds:uri="2b6f4d9c-e67e-4634-a886-8566b3a998fa"/>
-    <ds:schemaRef ds:uri="3c7d788f-59f0-4ee8-87d4-6b60b595ee8d"/>
+    <ds:schemaRef ds:uri="http://schemas.microsoft.com/sharepoint/v3/contenttype/forms"/>
   </ds:schemaRefs>
 </ds:datastoreItem>
 </file>
</xml_diff>